<commit_message>
Flesh out Java 9 Javadoc
Formalized the Javadoc in some cases. Updated the Gradle build to
properly generate the doc.
</commit_message>
<xml_diff>
--- a/Java 9 and up.pptx
+++ b/Java 9 and up.pptx
@@ -4,8 +4,28 @@
   <p:sldMasterIdLst>
     <p:sldMasterId id="2147483648" r:id="rId1"/>
   </p:sldMasterIdLst>
+  <p:notesMasterIdLst>
+    <p:notesMasterId r:id="rId20"/>
+  </p:notesMasterIdLst>
   <p:sldIdLst>
     <p:sldId id="256" r:id="rId2"/>
+    <p:sldId id="257" r:id="rId3"/>
+    <p:sldId id="262" r:id="rId4"/>
+    <p:sldId id="258" r:id="rId5"/>
+    <p:sldId id="263" r:id="rId6"/>
+    <p:sldId id="279" r:id="rId7"/>
+    <p:sldId id="281" r:id="rId8"/>
+    <p:sldId id="280" r:id="rId9"/>
+    <p:sldId id="282" r:id="rId10"/>
+    <p:sldId id="259" r:id="rId11"/>
+    <p:sldId id="264" r:id="rId12"/>
+    <p:sldId id="260" r:id="rId13"/>
+    <p:sldId id="265" r:id="rId14"/>
+    <p:sldId id="261" r:id="rId15"/>
+    <p:sldId id="266" r:id="rId16"/>
+    <p:sldId id="294" r:id="rId17"/>
+    <p:sldId id="295" r:id="rId18"/>
+    <p:sldId id="297" r:id="rId19"/>
   </p:sldIdLst>
   <p:sldSz cx="12192000" cy="6858000"/>
   <p:notesSz cx="6858000" cy="9144000"/>
@@ -104,7 +124,1016 @@
       </a:defRPr>
     </a:lvl9pPr>
   </p:defaultTextStyle>
+  <p:extLst>
+    <p:ext uri="{521415D9-36F7-43E2-AB2F-B90AF26B5E84}">
+      <p14:sectionLst xmlns:p14="http://schemas.microsoft.com/office/powerpoint/2010/main">
+        <p14:section name="Default Section" id="{F7981D95-A24D-6B4B-986A-6F4D945DFF8A}">
+          <p14:sldIdLst>
+            <p14:sldId id="256"/>
+          </p14:sldIdLst>
+        </p14:section>
+        <p14:section name="Intro" id="{B76EDD19-1900-054D-8759-95FB1C80B870}">
+          <p14:sldIdLst>
+            <p14:sldId id="257"/>
+            <p14:sldId id="262"/>
+          </p14:sldIdLst>
+        </p14:section>
+        <p14:section name="Language Changes" id="{74C37D44-53E3-044C-A140-3147082DB633}">
+          <p14:sldIdLst>
+            <p14:sldId id="258"/>
+            <p14:sldId id="263"/>
+            <p14:sldId id="279"/>
+            <p14:sldId id="281"/>
+            <p14:sldId id="280"/>
+            <p14:sldId id="282"/>
+          </p14:sldIdLst>
+        </p14:section>
+        <p14:section name="JDK" id="{4CD2E492-D05C-274B-A9E8-EE49CF21AC54}">
+          <p14:sldIdLst>
+            <p14:sldId id="259"/>
+            <p14:sldId id="264"/>
+          </p14:sldIdLst>
+        </p14:section>
+        <p14:section name="Tooling" id="{0CCF7B50-C21A-724A-BAC0-E3B2FC4E5D6B}">
+          <p14:sldIdLst>
+            <p14:sldId id="260"/>
+            <p14:sldId id="265"/>
+          </p14:sldIdLst>
+        </p14:section>
+        <p14:section name="Runtime" id="{6F3055AC-0052-9C41-9321-047244E67447}">
+          <p14:sldIdLst>
+            <p14:sldId id="261"/>
+            <p14:sldId id="266"/>
+          </p14:sldIdLst>
+        </p14:section>
+        <p14:section name="Epilogue" id="{9AFE8509-BD94-3E43-AA8C-0514A59DB3E6}">
+          <p14:sldIdLst>
+            <p14:sldId id="294"/>
+            <p14:sldId id="295"/>
+            <p14:sldId id="297"/>
+          </p14:sldIdLst>
+        </p14:section>
+      </p14:sectionLst>
+    </p:ext>
+    <p:ext uri="{EFAFB233-063F-42B5-8137-9DF3F51BA10A}">
+      <p15:sldGuideLst xmlns:p15="http://schemas.microsoft.com/office/powerpoint/2012/main"/>
+    </p:ext>
+  </p:extLst>
 </p:presentation>
+</file>
+
+<file path=ppt/notesMasters/notesMaster1.xml><?xml version="1.0" encoding="utf-8"?>
+<p:notesMaster xmlns:a="http://schemas.openxmlformats.org/drawingml/2006/main" xmlns:r="http://schemas.openxmlformats.org/officeDocument/2006/relationships" xmlns:p="http://schemas.openxmlformats.org/presentationml/2006/main">
+  <p:cSld>
+    <p:bg>
+      <p:bgRef idx="1001">
+        <a:schemeClr val="bg1"/>
+      </p:bgRef>
+    </p:bg>
+    <p:spTree>
+      <p:nvGrpSpPr>
+        <p:cNvPr id="1" name=""/>
+        <p:cNvGrpSpPr/>
+        <p:nvPr/>
+      </p:nvGrpSpPr>
+      <p:grpSpPr>
+        <a:xfrm>
+          <a:off x="0" y="0"/>
+          <a:ext cx="0" cy="0"/>
+          <a:chOff x="0" y="0"/>
+          <a:chExt cx="0" cy="0"/>
+        </a:xfrm>
+      </p:grpSpPr>
+      <p:sp>
+        <p:nvSpPr>
+          <p:cNvPr id="2" name="Header Placeholder 1"/>
+          <p:cNvSpPr>
+            <a:spLocks noGrp="1"/>
+          </p:cNvSpPr>
+          <p:nvPr>
+            <p:ph type="hdr" sz="quarter"/>
+          </p:nvPr>
+        </p:nvSpPr>
+        <p:spPr>
+          <a:xfrm>
+            <a:off x="0" y="0"/>
+            <a:ext cx="2971800" cy="458788"/>
+          </a:xfrm>
+          <a:prstGeom prst="rect">
+            <a:avLst/>
+          </a:prstGeom>
+        </p:spPr>
+        <p:txBody>
+          <a:bodyPr vert="horz" lIns="91440" tIns="45720" rIns="91440" bIns="45720" rtlCol="0"/>
+          <a:lstStyle>
+            <a:lvl1pPr algn="l">
+              <a:defRPr sz="1200"/>
+            </a:lvl1pPr>
+          </a:lstStyle>
+          <a:p>
+            <a:endParaRPr lang="en-US"/>
+          </a:p>
+        </p:txBody>
+      </p:sp>
+      <p:sp>
+        <p:nvSpPr>
+          <p:cNvPr id="3" name="Date Placeholder 2"/>
+          <p:cNvSpPr>
+            <a:spLocks noGrp="1"/>
+          </p:cNvSpPr>
+          <p:nvPr>
+            <p:ph type="dt" idx="1"/>
+          </p:nvPr>
+        </p:nvSpPr>
+        <p:spPr>
+          <a:xfrm>
+            <a:off x="3884613" y="0"/>
+            <a:ext cx="2971800" cy="458788"/>
+          </a:xfrm>
+          <a:prstGeom prst="rect">
+            <a:avLst/>
+          </a:prstGeom>
+        </p:spPr>
+        <p:txBody>
+          <a:bodyPr vert="horz" lIns="91440" tIns="45720" rIns="91440" bIns="45720" rtlCol="0"/>
+          <a:lstStyle>
+            <a:lvl1pPr algn="r">
+              <a:defRPr sz="1200"/>
+            </a:lvl1pPr>
+          </a:lstStyle>
+          <a:p>
+            <a:fld id="{77CD94AE-9584-5947-AE03-C43CD4CBFEED}" type="datetimeFigureOut">
+              <a:rPr lang="en-US" smtClean="0"/>
+              <a:t>12/28/20</a:t>
+            </a:fld>
+            <a:endParaRPr lang="en-US"/>
+          </a:p>
+        </p:txBody>
+      </p:sp>
+      <p:sp>
+        <p:nvSpPr>
+          <p:cNvPr id="4" name="Slide Image Placeholder 3"/>
+          <p:cNvSpPr>
+            <a:spLocks noGrp="1" noRot="1" noChangeAspect="1"/>
+          </p:cNvSpPr>
+          <p:nvPr>
+            <p:ph type="sldImg" idx="2"/>
+          </p:nvPr>
+        </p:nvSpPr>
+        <p:spPr>
+          <a:xfrm>
+            <a:off x="685800" y="1143000"/>
+            <a:ext cx="5486400" cy="3086100"/>
+          </a:xfrm>
+          <a:prstGeom prst="rect">
+            <a:avLst/>
+          </a:prstGeom>
+          <a:noFill/>
+          <a:ln w="12700">
+            <a:solidFill>
+              <a:prstClr val="black"/>
+            </a:solidFill>
+          </a:ln>
+        </p:spPr>
+        <p:txBody>
+          <a:bodyPr vert="horz" lIns="91440" tIns="45720" rIns="91440" bIns="45720" rtlCol="0" anchor="ctr"/>
+          <a:lstStyle/>
+          <a:p>
+            <a:endParaRPr lang="en-US"/>
+          </a:p>
+        </p:txBody>
+      </p:sp>
+      <p:sp>
+        <p:nvSpPr>
+          <p:cNvPr id="5" name="Notes Placeholder 4"/>
+          <p:cNvSpPr>
+            <a:spLocks noGrp="1"/>
+          </p:cNvSpPr>
+          <p:nvPr>
+            <p:ph type="body" sz="quarter" idx="3"/>
+          </p:nvPr>
+        </p:nvSpPr>
+        <p:spPr>
+          <a:xfrm>
+            <a:off x="685800" y="4400550"/>
+            <a:ext cx="5486400" cy="3600450"/>
+          </a:xfrm>
+          <a:prstGeom prst="rect">
+            <a:avLst/>
+          </a:prstGeom>
+        </p:spPr>
+        <p:txBody>
+          <a:bodyPr vert="horz" lIns="91440" tIns="45720" rIns="91440" bIns="45720" rtlCol="0"/>
+          <a:lstStyle/>
+          <a:p>
+            <a:pPr lvl="0"/>
+            <a:r>
+              <a:rPr lang="en-US"/>
+              <a:t>Click to edit Master text styles</a:t>
+            </a:r>
+          </a:p>
+          <a:p>
+            <a:pPr lvl="1"/>
+            <a:r>
+              <a:rPr lang="en-US"/>
+              <a:t>Second level</a:t>
+            </a:r>
+          </a:p>
+          <a:p>
+            <a:pPr lvl="2"/>
+            <a:r>
+              <a:rPr lang="en-US"/>
+              <a:t>Third level</a:t>
+            </a:r>
+          </a:p>
+          <a:p>
+            <a:pPr lvl="3"/>
+            <a:r>
+              <a:rPr lang="en-US"/>
+              <a:t>Fourth level</a:t>
+            </a:r>
+          </a:p>
+          <a:p>
+            <a:pPr lvl="4"/>
+            <a:r>
+              <a:rPr lang="en-US"/>
+              <a:t>Fifth level</a:t>
+            </a:r>
+          </a:p>
+        </p:txBody>
+      </p:sp>
+      <p:sp>
+        <p:nvSpPr>
+          <p:cNvPr id="6" name="Footer Placeholder 5"/>
+          <p:cNvSpPr>
+            <a:spLocks noGrp="1"/>
+          </p:cNvSpPr>
+          <p:nvPr>
+            <p:ph type="ftr" sz="quarter" idx="4"/>
+          </p:nvPr>
+        </p:nvSpPr>
+        <p:spPr>
+          <a:xfrm>
+            <a:off x="0" y="8685213"/>
+            <a:ext cx="2971800" cy="458787"/>
+          </a:xfrm>
+          <a:prstGeom prst="rect">
+            <a:avLst/>
+          </a:prstGeom>
+        </p:spPr>
+        <p:txBody>
+          <a:bodyPr vert="horz" lIns="91440" tIns="45720" rIns="91440" bIns="45720" rtlCol="0" anchor="b"/>
+          <a:lstStyle>
+            <a:lvl1pPr algn="l">
+              <a:defRPr sz="1200"/>
+            </a:lvl1pPr>
+          </a:lstStyle>
+          <a:p>
+            <a:endParaRPr lang="en-US"/>
+          </a:p>
+        </p:txBody>
+      </p:sp>
+      <p:sp>
+        <p:nvSpPr>
+          <p:cNvPr id="7" name="Slide Number Placeholder 6"/>
+          <p:cNvSpPr>
+            <a:spLocks noGrp="1"/>
+          </p:cNvSpPr>
+          <p:nvPr>
+            <p:ph type="sldNum" sz="quarter" idx="5"/>
+          </p:nvPr>
+        </p:nvSpPr>
+        <p:spPr>
+          <a:xfrm>
+            <a:off x="3884613" y="8685213"/>
+            <a:ext cx="2971800" cy="458787"/>
+          </a:xfrm>
+          <a:prstGeom prst="rect">
+            <a:avLst/>
+          </a:prstGeom>
+        </p:spPr>
+        <p:txBody>
+          <a:bodyPr vert="horz" lIns="91440" tIns="45720" rIns="91440" bIns="45720" rtlCol="0" anchor="b"/>
+          <a:lstStyle>
+            <a:lvl1pPr algn="r">
+              <a:defRPr sz="1200"/>
+            </a:lvl1pPr>
+          </a:lstStyle>
+          <a:p>
+            <a:fld id="{04A691DF-99D8-2A4F-A43E-F57D41F45428}" type="slidenum">
+              <a:rPr lang="en-US" smtClean="0"/>
+              <a:t>‹#›</a:t>
+            </a:fld>
+            <a:endParaRPr lang="en-US"/>
+          </a:p>
+        </p:txBody>
+      </p:sp>
+    </p:spTree>
+    <p:extLst>
+      <p:ext uri="{BB962C8B-B14F-4D97-AF65-F5344CB8AC3E}">
+        <p14:creationId xmlns:p14="http://schemas.microsoft.com/office/powerpoint/2010/main" val="2559207772"/>
+      </p:ext>
+    </p:extLst>
+  </p:cSld>
+  <p:clrMap bg1="lt1" tx1="dk1" bg2="lt2" tx2="dk2" accent1="accent1" accent2="accent2" accent3="accent3" accent4="accent4" accent5="accent5" accent6="accent6" hlink="hlink" folHlink="folHlink"/>
+  <p:notesStyle>
+    <a:lvl1pPr marL="0" algn="l" defTabSz="914400" rtl="0" eaLnBrk="1" latinLnBrk="0" hangingPunct="1">
+      <a:defRPr sz="1200" kern="1200">
+        <a:solidFill>
+          <a:schemeClr val="tx1"/>
+        </a:solidFill>
+        <a:latin typeface="+mn-lt"/>
+        <a:ea typeface="+mn-ea"/>
+        <a:cs typeface="+mn-cs"/>
+      </a:defRPr>
+    </a:lvl1pPr>
+    <a:lvl2pPr marL="457200" algn="l" defTabSz="914400" rtl="0" eaLnBrk="1" latinLnBrk="0" hangingPunct="1">
+      <a:defRPr sz="1200" kern="1200">
+        <a:solidFill>
+          <a:schemeClr val="tx1"/>
+        </a:solidFill>
+        <a:latin typeface="+mn-lt"/>
+        <a:ea typeface="+mn-ea"/>
+        <a:cs typeface="+mn-cs"/>
+      </a:defRPr>
+    </a:lvl2pPr>
+    <a:lvl3pPr marL="914400" algn="l" defTabSz="914400" rtl="0" eaLnBrk="1" latinLnBrk="0" hangingPunct="1">
+      <a:defRPr sz="1200" kern="1200">
+        <a:solidFill>
+          <a:schemeClr val="tx1"/>
+        </a:solidFill>
+        <a:latin typeface="+mn-lt"/>
+        <a:ea typeface="+mn-ea"/>
+        <a:cs typeface="+mn-cs"/>
+      </a:defRPr>
+    </a:lvl3pPr>
+    <a:lvl4pPr marL="1371600" algn="l" defTabSz="914400" rtl="0" eaLnBrk="1" latinLnBrk="0" hangingPunct="1">
+      <a:defRPr sz="1200" kern="1200">
+        <a:solidFill>
+          <a:schemeClr val="tx1"/>
+        </a:solidFill>
+        <a:latin typeface="+mn-lt"/>
+        <a:ea typeface="+mn-ea"/>
+        <a:cs typeface="+mn-cs"/>
+      </a:defRPr>
+    </a:lvl4pPr>
+    <a:lvl5pPr marL="1828800" algn="l" defTabSz="914400" rtl="0" eaLnBrk="1" latinLnBrk="0" hangingPunct="1">
+      <a:defRPr sz="1200" kern="1200">
+        <a:solidFill>
+          <a:schemeClr val="tx1"/>
+        </a:solidFill>
+        <a:latin typeface="+mn-lt"/>
+        <a:ea typeface="+mn-ea"/>
+        <a:cs typeface="+mn-cs"/>
+      </a:defRPr>
+    </a:lvl5pPr>
+    <a:lvl6pPr marL="2286000" algn="l" defTabSz="914400" rtl="0" eaLnBrk="1" latinLnBrk="0" hangingPunct="1">
+      <a:defRPr sz="1200" kern="1200">
+        <a:solidFill>
+          <a:schemeClr val="tx1"/>
+        </a:solidFill>
+        <a:latin typeface="+mn-lt"/>
+        <a:ea typeface="+mn-ea"/>
+        <a:cs typeface="+mn-cs"/>
+      </a:defRPr>
+    </a:lvl6pPr>
+    <a:lvl7pPr marL="2743200" algn="l" defTabSz="914400" rtl="0" eaLnBrk="1" latinLnBrk="0" hangingPunct="1">
+      <a:defRPr sz="1200" kern="1200">
+        <a:solidFill>
+          <a:schemeClr val="tx1"/>
+        </a:solidFill>
+        <a:latin typeface="+mn-lt"/>
+        <a:ea typeface="+mn-ea"/>
+        <a:cs typeface="+mn-cs"/>
+      </a:defRPr>
+    </a:lvl7pPr>
+    <a:lvl8pPr marL="3200400" algn="l" defTabSz="914400" rtl="0" eaLnBrk="1" latinLnBrk="0" hangingPunct="1">
+      <a:defRPr sz="1200" kern="1200">
+        <a:solidFill>
+          <a:schemeClr val="tx1"/>
+        </a:solidFill>
+        <a:latin typeface="+mn-lt"/>
+        <a:ea typeface="+mn-ea"/>
+        <a:cs typeface="+mn-cs"/>
+      </a:defRPr>
+    </a:lvl8pPr>
+    <a:lvl9pPr marL="3657600" algn="l" defTabSz="914400" rtl="0" eaLnBrk="1" latinLnBrk="0" hangingPunct="1">
+      <a:defRPr sz="1200" kern="1200">
+        <a:solidFill>
+          <a:schemeClr val="tx1"/>
+        </a:solidFill>
+        <a:latin typeface="+mn-lt"/>
+        <a:ea typeface="+mn-ea"/>
+        <a:cs typeface="+mn-cs"/>
+      </a:defRPr>
+    </a:lvl9pPr>
+  </p:notesStyle>
+</p:notesMaster>
+</file>
+
+<file path=ppt/notesSlides/notesSlide1.xml><?xml version="1.0" encoding="utf-8"?>
+<p:notes xmlns:a="http://schemas.openxmlformats.org/drawingml/2006/main" xmlns:r="http://schemas.openxmlformats.org/officeDocument/2006/relationships" xmlns:p="http://schemas.openxmlformats.org/presentationml/2006/main">
+  <p:cSld>
+    <p:spTree>
+      <p:nvGrpSpPr>
+        <p:cNvPr id="1" name=""/>
+        <p:cNvGrpSpPr/>
+        <p:nvPr/>
+      </p:nvGrpSpPr>
+      <p:grpSpPr>
+        <a:xfrm>
+          <a:off x="0" y="0"/>
+          <a:ext cx="0" cy="0"/>
+          <a:chOff x="0" y="0"/>
+          <a:chExt cx="0" cy="0"/>
+        </a:xfrm>
+      </p:grpSpPr>
+      <p:sp>
+        <p:nvSpPr>
+          <p:cNvPr id="2" name="Slide Image Placeholder 1"/>
+          <p:cNvSpPr>
+            <a:spLocks noGrp="1" noRot="1" noChangeAspect="1"/>
+          </p:cNvSpPr>
+          <p:nvPr>
+            <p:ph type="sldImg"/>
+          </p:nvPr>
+        </p:nvSpPr>
+        <p:spPr/>
+      </p:sp>
+      <p:sp>
+        <p:nvSpPr>
+          <p:cNvPr id="3" name="Notes Placeholder 2"/>
+          <p:cNvSpPr>
+            <a:spLocks noGrp="1"/>
+          </p:cNvSpPr>
+          <p:nvPr>
+            <p:ph type="body" idx="1"/>
+          </p:nvPr>
+        </p:nvSpPr>
+        <p:spPr/>
+        <p:txBody>
+          <a:bodyPr/>
+          <a:lstStyle/>
+          <a:p>
+            <a:endParaRPr lang="en-US" dirty="0"/>
+          </a:p>
+        </p:txBody>
+      </p:sp>
+      <p:sp>
+        <p:nvSpPr>
+          <p:cNvPr id="4" name="Slide Number Placeholder 3"/>
+          <p:cNvSpPr>
+            <a:spLocks noGrp="1"/>
+          </p:cNvSpPr>
+          <p:nvPr>
+            <p:ph type="sldNum" sz="quarter" idx="5"/>
+          </p:nvPr>
+        </p:nvSpPr>
+        <p:spPr/>
+        <p:txBody>
+          <a:bodyPr/>
+          <a:lstStyle/>
+          <a:p>
+            <a:fld id="{04A691DF-99D8-2A4F-A43E-F57D41F45428}" type="slidenum">
+              <a:rPr lang="en-US" smtClean="0"/>
+              <a:t>3</a:t>
+            </a:fld>
+            <a:endParaRPr lang="en-US"/>
+          </a:p>
+        </p:txBody>
+      </p:sp>
+    </p:spTree>
+    <p:extLst>
+      <p:ext uri="{BB962C8B-B14F-4D97-AF65-F5344CB8AC3E}">
+        <p14:creationId xmlns:p14="http://schemas.microsoft.com/office/powerpoint/2010/main" val="3760510811"/>
+      </p:ext>
+    </p:extLst>
+  </p:cSld>
+  <p:clrMapOvr>
+    <a:masterClrMapping/>
+  </p:clrMapOvr>
+</p:notes>
+</file>
+
+<file path=ppt/notesSlides/notesSlide2.xml><?xml version="1.0" encoding="utf-8"?>
+<p:notes xmlns:a="http://schemas.openxmlformats.org/drawingml/2006/main" xmlns:r="http://schemas.openxmlformats.org/officeDocument/2006/relationships" xmlns:p="http://schemas.openxmlformats.org/presentationml/2006/main">
+  <p:cSld>
+    <p:spTree>
+      <p:nvGrpSpPr>
+        <p:cNvPr id="1" name=""/>
+        <p:cNvGrpSpPr/>
+        <p:nvPr/>
+      </p:nvGrpSpPr>
+      <p:grpSpPr>
+        <a:xfrm>
+          <a:off x="0" y="0"/>
+          <a:ext cx="0" cy="0"/>
+          <a:chOff x="0" y="0"/>
+          <a:chExt cx="0" cy="0"/>
+        </a:xfrm>
+      </p:grpSpPr>
+      <p:sp>
+        <p:nvSpPr>
+          <p:cNvPr id="2" name="Slide Image Placeholder 1"/>
+          <p:cNvSpPr>
+            <a:spLocks noGrp="1" noRot="1" noChangeAspect="1"/>
+          </p:cNvSpPr>
+          <p:nvPr>
+            <p:ph type="sldImg"/>
+          </p:nvPr>
+        </p:nvSpPr>
+        <p:spPr/>
+      </p:sp>
+      <p:sp>
+        <p:nvSpPr>
+          <p:cNvPr id="3" name="Notes Placeholder 2"/>
+          <p:cNvSpPr>
+            <a:spLocks noGrp="1"/>
+          </p:cNvSpPr>
+          <p:nvPr>
+            <p:ph type="body" idx="1"/>
+          </p:nvPr>
+        </p:nvSpPr>
+        <p:spPr/>
+        <p:txBody>
+          <a:bodyPr/>
+          <a:lstStyle/>
+          <a:p>
+            <a:endParaRPr lang="en-US" dirty="0"/>
+          </a:p>
+        </p:txBody>
+      </p:sp>
+      <p:sp>
+        <p:nvSpPr>
+          <p:cNvPr id="4" name="Slide Number Placeholder 3"/>
+          <p:cNvSpPr>
+            <a:spLocks noGrp="1"/>
+          </p:cNvSpPr>
+          <p:nvPr>
+            <p:ph type="sldNum" sz="quarter" idx="5"/>
+          </p:nvPr>
+        </p:nvSpPr>
+        <p:spPr/>
+        <p:txBody>
+          <a:bodyPr/>
+          <a:lstStyle/>
+          <a:p>
+            <a:fld id="{04A691DF-99D8-2A4F-A43E-F57D41F45428}" type="slidenum">
+              <a:rPr lang="en-US" smtClean="0"/>
+              <a:t>5</a:t>
+            </a:fld>
+            <a:endParaRPr lang="en-US"/>
+          </a:p>
+        </p:txBody>
+      </p:sp>
+    </p:spTree>
+    <p:extLst>
+      <p:ext uri="{BB962C8B-B14F-4D97-AF65-F5344CB8AC3E}">
+        <p14:creationId xmlns:p14="http://schemas.microsoft.com/office/powerpoint/2010/main" val="3972942031"/>
+      </p:ext>
+    </p:extLst>
+  </p:cSld>
+  <p:clrMapOvr>
+    <a:masterClrMapping/>
+  </p:clrMapOvr>
+</p:notes>
+</file>
+
+<file path=ppt/notesSlides/notesSlide3.xml><?xml version="1.0" encoding="utf-8"?>
+<p:notes xmlns:a="http://schemas.openxmlformats.org/drawingml/2006/main" xmlns:r="http://schemas.openxmlformats.org/officeDocument/2006/relationships" xmlns:p="http://schemas.openxmlformats.org/presentationml/2006/main">
+  <p:cSld>
+    <p:spTree>
+      <p:nvGrpSpPr>
+        <p:cNvPr id="1" name=""/>
+        <p:cNvGrpSpPr/>
+        <p:nvPr/>
+      </p:nvGrpSpPr>
+      <p:grpSpPr>
+        <a:xfrm>
+          <a:off x="0" y="0"/>
+          <a:ext cx="0" cy="0"/>
+          <a:chOff x="0" y="0"/>
+          <a:chExt cx="0" cy="0"/>
+        </a:xfrm>
+      </p:grpSpPr>
+      <p:sp>
+        <p:nvSpPr>
+          <p:cNvPr id="2" name="Slide Image Placeholder 1"/>
+          <p:cNvSpPr>
+            <a:spLocks noGrp="1" noRot="1" noChangeAspect="1"/>
+          </p:cNvSpPr>
+          <p:nvPr>
+            <p:ph type="sldImg"/>
+          </p:nvPr>
+        </p:nvSpPr>
+        <p:spPr/>
+      </p:sp>
+      <p:sp>
+        <p:nvSpPr>
+          <p:cNvPr id="3" name="Notes Placeholder 2"/>
+          <p:cNvSpPr>
+            <a:spLocks noGrp="1"/>
+          </p:cNvSpPr>
+          <p:nvPr>
+            <p:ph type="body" idx="1"/>
+          </p:nvPr>
+        </p:nvSpPr>
+        <p:spPr/>
+        <p:txBody>
+          <a:bodyPr/>
+          <a:lstStyle/>
+          <a:p>
+            <a:endParaRPr lang="en-US" dirty="0"/>
+          </a:p>
+        </p:txBody>
+      </p:sp>
+      <p:sp>
+        <p:nvSpPr>
+          <p:cNvPr id="4" name="Slide Number Placeholder 3"/>
+          <p:cNvSpPr>
+            <a:spLocks noGrp="1"/>
+          </p:cNvSpPr>
+          <p:nvPr>
+            <p:ph type="sldNum" sz="quarter" idx="5"/>
+          </p:nvPr>
+        </p:nvSpPr>
+        <p:spPr/>
+        <p:txBody>
+          <a:bodyPr/>
+          <a:lstStyle/>
+          <a:p>
+            <a:fld id="{B74070AD-33A4-834F-B7FB-BE5272A61543}" type="slidenum">
+              <a:rPr lang="en-US" smtClean="0"/>
+              <a:t>6</a:t>
+            </a:fld>
+            <a:endParaRPr lang="en-US"/>
+          </a:p>
+        </p:txBody>
+      </p:sp>
+    </p:spTree>
+    <p:extLst>
+      <p:ext uri="{BB962C8B-B14F-4D97-AF65-F5344CB8AC3E}">
+        <p14:creationId xmlns:p14="http://schemas.microsoft.com/office/powerpoint/2010/main" val="2277160969"/>
+      </p:ext>
+    </p:extLst>
+  </p:cSld>
+  <p:clrMapOvr>
+    <a:masterClrMapping/>
+  </p:clrMapOvr>
+</p:notes>
+</file>
+
+<file path=ppt/notesSlides/notesSlide4.xml><?xml version="1.0" encoding="utf-8"?>
+<p:notes xmlns:a="http://schemas.openxmlformats.org/drawingml/2006/main" xmlns:r="http://schemas.openxmlformats.org/officeDocument/2006/relationships" xmlns:p="http://schemas.openxmlformats.org/presentationml/2006/main">
+  <p:cSld>
+    <p:spTree>
+      <p:nvGrpSpPr>
+        <p:cNvPr id="1" name=""/>
+        <p:cNvGrpSpPr/>
+        <p:nvPr/>
+      </p:nvGrpSpPr>
+      <p:grpSpPr>
+        <a:xfrm>
+          <a:off x="0" y="0"/>
+          <a:ext cx="0" cy="0"/>
+          <a:chOff x="0" y="0"/>
+          <a:chExt cx="0" cy="0"/>
+        </a:xfrm>
+      </p:grpSpPr>
+      <p:sp>
+        <p:nvSpPr>
+          <p:cNvPr id="2" name="Slide Image Placeholder 1"/>
+          <p:cNvSpPr>
+            <a:spLocks noGrp="1" noRot="1" noChangeAspect="1"/>
+          </p:cNvSpPr>
+          <p:nvPr>
+            <p:ph type="sldImg"/>
+          </p:nvPr>
+        </p:nvSpPr>
+        <p:spPr/>
+      </p:sp>
+      <p:sp>
+        <p:nvSpPr>
+          <p:cNvPr id="3" name="Notes Placeholder 2"/>
+          <p:cNvSpPr>
+            <a:spLocks noGrp="1"/>
+          </p:cNvSpPr>
+          <p:nvPr>
+            <p:ph type="body" idx="1"/>
+          </p:nvPr>
+        </p:nvSpPr>
+        <p:spPr/>
+        <p:txBody>
+          <a:bodyPr/>
+          <a:lstStyle/>
+          <a:p>
+            <a:r>
+              <a:rPr lang="en-US" dirty="0"/>
+              <a:t>For instance, a library can contain three versions of `</a:t>
+            </a:r>
+            <a:r>
+              <a:rPr lang="en-US" dirty="0" err="1"/>
+              <a:t>Foo.class</a:t>
+            </a:r>
+            <a:r>
+              <a:rPr lang="en-US" dirty="0"/>
+              <a:t>`: one specific to Java 14, one specific to Java 11, and a generic one. The platform will load which is most “compatible”.</a:t>
+            </a:r>
+          </a:p>
+        </p:txBody>
+      </p:sp>
+      <p:sp>
+        <p:nvSpPr>
+          <p:cNvPr id="4" name="Slide Number Placeholder 3"/>
+          <p:cNvSpPr>
+            <a:spLocks noGrp="1"/>
+          </p:cNvSpPr>
+          <p:nvPr>
+            <p:ph type="sldNum" sz="quarter" idx="5"/>
+          </p:nvPr>
+        </p:nvSpPr>
+        <p:spPr/>
+        <p:txBody>
+          <a:bodyPr/>
+          <a:lstStyle/>
+          <a:p>
+            <a:fld id="{B74070AD-33A4-834F-B7FB-BE5272A61543}" type="slidenum">
+              <a:rPr lang="en-US" smtClean="0"/>
+              <a:t>7</a:t>
+            </a:fld>
+            <a:endParaRPr lang="en-US"/>
+          </a:p>
+        </p:txBody>
+      </p:sp>
+    </p:spTree>
+    <p:extLst>
+      <p:ext uri="{BB962C8B-B14F-4D97-AF65-F5344CB8AC3E}">
+        <p14:creationId xmlns:p14="http://schemas.microsoft.com/office/powerpoint/2010/main" val="4286344421"/>
+      </p:ext>
+    </p:extLst>
+  </p:cSld>
+  <p:clrMapOvr>
+    <a:masterClrMapping/>
+  </p:clrMapOvr>
+</p:notes>
+</file>
+
+<file path=ppt/notesSlides/notesSlide5.xml><?xml version="1.0" encoding="utf-8"?>
+<p:notes xmlns:a="http://schemas.openxmlformats.org/drawingml/2006/main" xmlns:r="http://schemas.openxmlformats.org/officeDocument/2006/relationships" xmlns:p="http://schemas.openxmlformats.org/presentationml/2006/main">
+  <p:cSld>
+    <p:spTree>
+      <p:nvGrpSpPr>
+        <p:cNvPr id="1" name=""/>
+        <p:cNvGrpSpPr/>
+        <p:nvPr/>
+      </p:nvGrpSpPr>
+      <p:grpSpPr>
+        <a:xfrm>
+          <a:off x="0" y="0"/>
+          <a:ext cx="0" cy="0"/>
+          <a:chOff x="0" y="0"/>
+          <a:chExt cx="0" cy="0"/>
+        </a:xfrm>
+      </p:grpSpPr>
+      <p:sp>
+        <p:nvSpPr>
+          <p:cNvPr id="2" name="Slide Image Placeholder 1"/>
+          <p:cNvSpPr>
+            <a:spLocks noGrp="1" noRot="1" noChangeAspect="1"/>
+          </p:cNvSpPr>
+          <p:nvPr>
+            <p:ph type="sldImg"/>
+          </p:nvPr>
+        </p:nvSpPr>
+        <p:spPr/>
+      </p:sp>
+      <p:sp>
+        <p:nvSpPr>
+          <p:cNvPr id="3" name="Notes Placeholder 2"/>
+          <p:cNvSpPr>
+            <a:spLocks noGrp="1"/>
+          </p:cNvSpPr>
+          <p:nvPr>
+            <p:ph type="body" idx="1"/>
+          </p:nvPr>
+        </p:nvSpPr>
+        <p:spPr/>
+        <p:txBody>
+          <a:bodyPr/>
+          <a:lstStyle/>
+          <a:p>
+            <a:r>
+              <a:rPr lang="en-US" dirty="0"/>
+              <a:t>We’ll also talk about modules later</a:t>
+            </a:r>
+          </a:p>
+        </p:txBody>
+      </p:sp>
+      <p:sp>
+        <p:nvSpPr>
+          <p:cNvPr id="4" name="Slide Number Placeholder 3"/>
+          <p:cNvSpPr>
+            <a:spLocks noGrp="1"/>
+          </p:cNvSpPr>
+          <p:nvPr>
+            <p:ph type="sldNum" sz="quarter" idx="5"/>
+          </p:nvPr>
+        </p:nvSpPr>
+        <p:spPr/>
+        <p:txBody>
+          <a:bodyPr/>
+          <a:lstStyle/>
+          <a:p>
+            <a:fld id="{B74070AD-33A4-834F-B7FB-BE5272A61543}" type="slidenum">
+              <a:rPr lang="en-US" smtClean="0"/>
+              <a:t>8</a:t>
+            </a:fld>
+            <a:endParaRPr lang="en-US"/>
+          </a:p>
+        </p:txBody>
+      </p:sp>
+    </p:spTree>
+    <p:extLst>
+      <p:ext uri="{BB962C8B-B14F-4D97-AF65-F5344CB8AC3E}">
+        <p14:creationId xmlns:p14="http://schemas.microsoft.com/office/powerpoint/2010/main" val="3587578964"/>
+      </p:ext>
+    </p:extLst>
+  </p:cSld>
+  <p:clrMapOvr>
+    <a:masterClrMapping/>
+  </p:clrMapOvr>
+</p:notes>
+</file>
+
+<file path=ppt/notesSlides/notesSlide6.xml><?xml version="1.0" encoding="utf-8"?>
+<p:notes xmlns:a="http://schemas.openxmlformats.org/drawingml/2006/main" xmlns:r="http://schemas.openxmlformats.org/officeDocument/2006/relationships" xmlns:p="http://schemas.openxmlformats.org/presentationml/2006/main">
+  <p:cSld>
+    <p:spTree>
+      <p:nvGrpSpPr>
+        <p:cNvPr id="1" name=""/>
+        <p:cNvGrpSpPr/>
+        <p:nvPr/>
+      </p:nvGrpSpPr>
+      <p:grpSpPr>
+        <a:xfrm>
+          <a:off x="0" y="0"/>
+          <a:ext cx="0" cy="0"/>
+          <a:chOff x="0" y="0"/>
+          <a:chExt cx="0" cy="0"/>
+        </a:xfrm>
+      </p:grpSpPr>
+      <p:sp>
+        <p:nvSpPr>
+          <p:cNvPr id="2" name="Slide Image Placeholder 1"/>
+          <p:cNvSpPr>
+            <a:spLocks noGrp="1" noRot="1" noChangeAspect="1"/>
+          </p:cNvSpPr>
+          <p:nvPr>
+            <p:ph type="sldImg"/>
+          </p:nvPr>
+        </p:nvSpPr>
+        <p:spPr/>
+      </p:sp>
+      <p:sp>
+        <p:nvSpPr>
+          <p:cNvPr id="3" name="Notes Placeholder 2"/>
+          <p:cNvSpPr>
+            <a:spLocks noGrp="1"/>
+          </p:cNvSpPr>
+          <p:nvPr>
+            <p:ph type="body" idx="1"/>
+          </p:nvPr>
+        </p:nvSpPr>
+        <p:spPr/>
+        <p:txBody>
+          <a:bodyPr/>
+          <a:lstStyle/>
+          <a:p>
+            <a:r>
+              <a:rPr lang="en-US" dirty="0"/>
+              <a:t>Since these private methods can only be used by the actual interface, and not by implementors or extenders, they are just a “factoring” tool, for encapsulating common behavior needed by default methods.</a:t>
+            </a:r>
+          </a:p>
+        </p:txBody>
+      </p:sp>
+      <p:sp>
+        <p:nvSpPr>
+          <p:cNvPr id="4" name="Slide Number Placeholder 3"/>
+          <p:cNvSpPr>
+            <a:spLocks noGrp="1"/>
+          </p:cNvSpPr>
+          <p:nvPr>
+            <p:ph type="sldNum" sz="quarter" idx="5"/>
+          </p:nvPr>
+        </p:nvSpPr>
+        <p:spPr/>
+        <p:txBody>
+          <a:bodyPr/>
+          <a:lstStyle/>
+          <a:p>
+            <a:fld id="{B74070AD-33A4-834F-B7FB-BE5272A61543}" type="slidenum">
+              <a:rPr lang="en-US" smtClean="0"/>
+              <a:t>9</a:t>
+            </a:fld>
+            <a:endParaRPr lang="en-US"/>
+          </a:p>
+        </p:txBody>
+      </p:sp>
+    </p:spTree>
+    <p:extLst>
+      <p:ext uri="{BB962C8B-B14F-4D97-AF65-F5344CB8AC3E}">
+        <p14:creationId xmlns:p14="http://schemas.microsoft.com/office/powerpoint/2010/main" val="2204691662"/>
+      </p:ext>
+    </p:extLst>
+  </p:cSld>
+  <p:clrMapOvr>
+    <a:masterClrMapping/>
+  </p:clrMapOvr>
+</p:notes>
+</file>
+
+<file path=ppt/notesSlides/notesSlide7.xml><?xml version="1.0" encoding="utf-8"?>
+<p:notes xmlns:a="http://schemas.openxmlformats.org/drawingml/2006/main" xmlns:r="http://schemas.openxmlformats.org/officeDocument/2006/relationships" xmlns:p="http://schemas.openxmlformats.org/presentationml/2006/main">
+  <p:cSld>
+    <p:spTree>
+      <p:nvGrpSpPr>
+        <p:cNvPr id="1" name=""/>
+        <p:cNvGrpSpPr/>
+        <p:nvPr/>
+      </p:nvGrpSpPr>
+      <p:grpSpPr>
+        <a:xfrm>
+          <a:off x="0" y="0"/>
+          <a:ext cx="0" cy="0"/>
+          <a:chOff x="0" y="0"/>
+          <a:chExt cx="0" cy="0"/>
+        </a:xfrm>
+      </p:grpSpPr>
+      <p:sp>
+        <p:nvSpPr>
+          <p:cNvPr id="2" name="Slide Image Placeholder 1"/>
+          <p:cNvSpPr>
+            <a:spLocks noGrp="1" noRot="1" noChangeAspect="1"/>
+          </p:cNvSpPr>
+          <p:nvPr>
+            <p:ph type="sldImg"/>
+          </p:nvPr>
+        </p:nvSpPr>
+        <p:spPr/>
+      </p:sp>
+      <p:sp>
+        <p:nvSpPr>
+          <p:cNvPr id="3" name="Notes Placeholder 2"/>
+          <p:cNvSpPr>
+            <a:spLocks noGrp="1"/>
+          </p:cNvSpPr>
+          <p:nvPr>
+            <p:ph type="body" idx="1"/>
+          </p:nvPr>
+        </p:nvSpPr>
+        <p:spPr/>
+        <p:txBody>
+          <a:bodyPr/>
+          <a:lstStyle/>
+          <a:p>
+            <a:endParaRPr lang="en-US" dirty="0"/>
+          </a:p>
+        </p:txBody>
+      </p:sp>
+      <p:sp>
+        <p:nvSpPr>
+          <p:cNvPr id="4" name="Slide Number Placeholder 3"/>
+          <p:cNvSpPr>
+            <a:spLocks noGrp="1"/>
+          </p:cNvSpPr>
+          <p:nvPr>
+            <p:ph type="sldNum" sz="quarter" idx="5"/>
+          </p:nvPr>
+        </p:nvSpPr>
+        <p:spPr/>
+        <p:txBody>
+          <a:bodyPr/>
+          <a:lstStyle/>
+          <a:p>
+            <a:fld id="{B74070AD-33A4-834F-B7FB-BE5272A61543}" type="slidenum">
+              <a:rPr lang="en-US" smtClean="0"/>
+              <a:t>18</a:t>
+            </a:fld>
+            <a:endParaRPr lang="en-US"/>
+          </a:p>
+        </p:txBody>
+      </p:sp>
+    </p:spTree>
+    <p:extLst>
+      <p:ext uri="{BB962C8B-B14F-4D97-AF65-F5344CB8AC3E}">
+        <p14:creationId xmlns:p14="http://schemas.microsoft.com/office/powerpoint/2010/main" val="3981770996"/>
+      </p:ext>
+    </p:extLst>
+  </p:cSld>
+  <p:clrMapOvr>
+    <a:masterClrMapping/>
+  </p:clrMapOvr>
+</p:notes>
 </file>
 
 <file path=ppt/slideLayouts/slideLayout1.xml><?xml version="1.0" encoding="utf-8"?>
@@ -337,7 +1366,7 @@
             <a:fld id="{B61BEF0D-F0BB-DE4B-95CE-6DB70DBA9567}" type="datetimeFigureOut">
               <a:rPr lang="en-US" dirty="0"/>
               <a:pPr/>
-              <a:t>12/16/20</a:t>
+              <a:t>12/28/20</a:t>
             </a:fld>
             <a:endParaRPr lang="en-US" dirty="0"/>
           </a:p>
@@ -668,7 +1697,7 @@
             <a:fld id="{B61BEF0D-F0BB-DE4B-95CE-6DB70DBA9567}" type="datetimeFigureOut">
               <a:rPr lang="en-US" dirty="0"/>
               <a:pPr/>
-              <a:t>12/16/20</a:t>
+              <a:t>12/28/20</a:t>
             </a:fld>
             <a:endParaRPr lang="en-US" dirty="0"/>
           </a:p>
@@ -943,7 +1972,7 @@
             <a:fld id="{B61BEF0D-F0BB-DE4B-95CE-6DB70DBA9567}" type="datetimeFigureOut">
               <a:rPr lang="en-US" dirty="0"/>
               <a:pPr/>
-              <a:t>12/16/20</a:t>
+              <a:t>12/28/20</a:t>
             </a:fld>
             <a:endParaRPr lang="en-US" dirty="0"/>
           </a:p>
@@ -1508,7 +2537,7 @@
             <a:fld id="{B61BEF0D-F0BB-DE4B-95CE-6DB70DBA9567}" type="datetimeFigureOut">
               <a:rPr lang="en-US" dirty="0"/>
               <a:pPr/>
-              <a:t>12/16/20</a:t>
+              <a:t>12/28/20</a:t>
             </a:fld>
             <a:endParaRPr lang="en-US" dirty="0"/>
           </a:p>
@@ -1783,7 +2812,7 @@
             <a:fld id="{B61BEF0D-F0BB-DE4B-95CE-6DB70DBA9567}" type="datetimeFigureOut">
               <a:rPr lang="en-US" dirty="0"/>
               <a:pPr/>
-              <a:t>12/16/20</a:t>
+              <a:t>12/28/20</a:t>
             </a:fld>
             <a:endParaRPr lang="en-US" dirty="0"/>
           </a:p>
@@ -2342,7 +3371,7 @@
             <a:fld id="{B61BEF0D-F0BB-DE4B-95CE-6DB70DBA9567}" type="datetimeFigureOut">
               <a:rPr lang="en-US" dirty="0"/>
               <a:pPr/>
-              <a:t>12/16/20</a:t>
+              <a:t>12/28/20</a:t>
             </a:fld>
             <a:endParaRPr lang="en-US" dirty="0"/>
           </a:p>
@@ -2666,7 +3695,7 @@
             <a:fld id="{B61BEF0D-F0BB-DE4B-95CE-6DB70DBA9567}" type="datetimeFigureOut">
               <a:rPr lang="en-US" dirty="0"/>
               <a:pPr/>
-              <a:t>12/16/20</a:t>
+              <a:t>12/28/20</a:t>
             </a:fld>
             <a:endParaRPr lang="en-US" dirty="0"/>
           </a:p>
@@ -2840,7 +3869,7 @@
             <a:fld id="{B61BEF0D-F0BB-DE4B-95CE-6DB70DBA9567}" type="datetimeFigureOut">
               <a:rPr lang="en-US" dirty="0"/>
               <a:pPr/>
-              <a:t>12/16/20</a:t>
+              <a:t>12/28/20</a:t>
             </a:fld>
             <a:endParaRPr lang="en-US" dirty="0"/>
           </a:p>
@@ -3075,7 +4104,7 @@
             <a:fld id="{B61BEF0D-F0BB-DE4B-95CE-6DB70DBA9567}" type="datetimeFigureOut">
               <a:rPr lang="en-US" dirty="0"/>
               <a:pPr/>
-              <a:t>12/16/20</a:t>
+              <a:t>12/28/20</a:t>
             </a:fld>
             <a:endParaRPr lang="en-US" dirty="0"/>
           </a:p>
@@ -3272,7 +4301,7 @@
             <a:fld id="{B61BEF0D-F0BB-DE4B-95CE-6DB70DBA9567}" type="datetimeFigureOut">
               <a:rPr lang="en-US" dirty="0"/>
               <a:pPr/>
-              <a:t>12/16/20</a:t>
+              <a:t>12/28/20</a:t>
             </a:fld>
             <a:endParaRPr lang="en-US" dirty="0"/>
           </a:p>
@@ -3545,7 +4574,7 @@
             <a:fld id="{B61BEF0D-F0BB-DE4B-95CE-6DB70DBA9567}" type="datetimeFigureOut">
               <a:rPr lang="en-US" dirty="0"/>
               <a:pPr/>
-              <a:t>12/16/20</a:t>
+              <a:t>12/28/20</a:t>
             </a:fld>
             <a:endParaRPr lang="en-US" dirty="0"/>
           </a:p>
@@ -3808,7 +4837,7 @@
             <a:fld id="{B61BEF0D-F0BB-DE4B-95CE-6DB70DBA9567}" type="datetimeFigureOut">
               <a:rPr lang="en-US" dirty="0"/>
               <a:pPr/>
-              <a:t>12/16/20</a:t>
+              <a:t>12/28/20</a:t>
             </a:fld>
             <a:endParaRPr lang="en-US" dirty="0"/>
           </a:p>
@@ -4179,7 +5208,7 @@
             <a:fld id="{B61BEF0D-F0BB-DE4B-95CE-6DB70DBA9567}" type="datetimeFigureOut">
               <a:rPr lang="en-US" dirty="0"/>
               <a:pPr/>
-              <a:t>12/16/20</a:t>
+              <a:t>12/28/20</a:t>
             </a:fld>
             <a:endParaRPr lang="en-US" dirty="0"/>
           </a:p>
@@ -4324,7 +5353,7 @@
             <a:fld id="{B61BEF0D-F0BB-DE4B-95CE-6DB70DBA9567}" type="datetimeFigureOut">
               <a:rPr lang="en-US" dirty="0"/>
               <a:pPr/>
-              <a:t>12/16/20</a:t>
+              <a:t>12/28/20</a:t>
             </a:fld>
             <a:endParaRPr lang="en-US" dirty="0"/>
           </a:p>
@@ -4446,7 +5475,7 @@
             <a:fld id="{B61BEF0D-F0BB-DE4B-95CE-6DB70DBA9567}" type="datetimeFigureOut">
               <a:rPr lang="en-US" dirty="0"/>
               <a:pPr/>
-              <a:t>12/16/20</a:t>
+              <a:t>12/28/20</a:t>
             </a:fld>
             <a:endParaRPr lang="en-US" dirty="0"/>
           </a:p>
@@ -4728,7 +5757,7 @@
             <a:fld id="{B61BEF0D-F0BB-DE4B-95CE-6DB70DBA9567}" type="datetimeFigureOut">
               <a:rPr lang="en-US" dirty="0"/>
               <a:pPr/>
-              <a:t>12/16/20</a:t>
+              <a:t>12/28/20</a:t>
             </a:fld>
             <a:endParaRPr lang="en-US" dirty="0"/>
           </a:p>
@@ -5049,7 +6078,7 @@
             <a:fld id="{B61BEF0D-F0BB-DE4B-95CE-6DB70DBA9567}" type="datetimeFigureOut">
               <a:rPr lang="en-US" dirty="0"/>
               <a:pPr/>
-              <a:t>12/16/20</a:t>
+              <a:t>12/28/20</a:t>
             </a:fld>
             <a:endParaRPr lang="en-US" dirty="0"/>
           </a:p>
@@ -5260,7 +6289,7 @@
             <a:fld id="{B61BEF0D-F0BB-DE4B-95CE-6DB70DBA9567}" type="datetimeFigureOut">
               <a:rPr lang="en-US" dirty="0"/>
               <a:pPr/>
-              <a:t>12/16/20</a:t>
+              <a:t>12/28/20</a:t>
             </a:fld>
             <a:endParaRPr lang="en-US" dirty="0"/>
           </a:p>
@@ -5815,18 +6844,15 @@
         </p:nvSpPr>
         <p:spPr/>
         <p:txBody>
-          <a:bodyPr/>
-          <a:lstStyle/>
-          <a:p>
-            <a:r>
-              <a:rPr lang="en-US" dirty="0"/>
-              <a:t>The next generation. A whole new world. Not your </a:t>
-            </a:r>
-            <a:r>
-              <a:rPr lang="en-US"/>
-              <a:t>mama’s Java.</a:t>
-            </a:r>
-            <a:endParaRPr lang="en-US" dirty="0"/>
+          <a:bodyPr>
+            <a:normAutofit/>
+          </a:bodyPr>
+          <a:lstStyle/>
+          <a:p>
+            <a:r>
+              <a:rPr lang="en-US" sz="1700" dirty="0"/>
+              <a:t>The next generation. A whole new world. Not your mama’s Java. 🎉</a:t>
+            </a:r>
           </a:p>
         </p:txBody>
       </p:sp>
@@ -5840,6 +6866,3150 @@
   <p:clrMapOvr>
     <a:masterClrMapping/>
   </p:clrMapOvr>
+</p:sld>
+</file>
+
+<file path=ppt/slides/slide10.xml><?xml version="1.0" encoding="utf-8"?>
+<p:sld xmlns:a="http://schemas.openxmlformats.org/drawingml/2006/main" xmlns:r="http://schemas.openxmlformats.org/officeDocument/2006/relationships" xmlns:p="http://schemas.openxmlformats.org/presentationml/2006/main">
+  <p:cSld>
+    <p:spTree>
+      <p:nvGrpSpPr>
+        <p:cNvPr id="1" name=""/>
+        <p:cNvGrpSpPr/>
+        <p:nvPr/>
+      </p:nvGrpSpPr>
+      <p:grpSpPr>
+        <a:xfrm>
+          <a:off x="0" y="0"/>
+          <a:ext cx="0" cy="0"/>
+          <a:chOff x="0" y="0"/>
+          <a:chExt cx="0" cy="0"/>
+        </a:xfrm>
+      </p:grpSpPr>
+      <p:sp>
+        <p:nvSpPr>
+          <p:cNvPr id="2" name="Title 1">
+            <a:extLst>
+              <a:ext uri="{FF2B5EF4-FFF2-40B4-BE49-F238E27FC236}">
+                <a16:creationId xmlns:a16="http://schemas.microsoft.com/office/drawing/2014/main" id="{CAE8B7DD-7432-C345-AEFF-71B13AF12709}"/>
+              </a:ext>
+            </a:extLst>
+          </p:cNvPr>
+          <p:cNvSpPr>
+            <a:spLocks noGrp="1"/>
+          </p:cNvSpPr>
+          <p:nvPr>
+            <p:ph type="title"/>
+          </p:nvPr>
+        </p:nvSpPr>
+        <p:spPr/>
+        <p:txBody>
+          <a:bodyPr/>
+          <a:lstStyle/>
+          <a:p>
+            <a:r>
+              <a:rPr lang="en-US" dirty="0"/>
+              <a:t>JDK</a:t>
+            </a:r>
+          </a:p>
+        </p:txBody>
+      </p:sp>
+      <p:sp>
+        <p:nvSpPr>
+          <p:cNvPr id="3" name="Text Placeholder 2">
+            <a:extLst>
+              <a:ext uri="{FF2B5EF4-FFF2-40B4-BE49-F238E27FC236}">
+                <a16:creationId xmlns:a16="http://schemas.microsoft.com/office/drawing/2014/main" id="{24A29295-5F24-7849-93C0-9B21BD47100D}"/>
+              </a:ext>
+            </a:extLst>
+          </p:cNvPr>
+          <p:cNvSpPr>
+            <a:spLocks noGrp="1"/>
+          </p:cNvSpPr>
+          <p:nvPr>
+            <p:ph type="body" idx="1"/>
+          </p:nvPr>
+        </p:nvSpPr>
+        <p:spPr/>
+        <p:txBody>
+          <a:bodyPr/>
+          <a:lstStyle/>
+          <a:p>
+            <a:r>
+              <a:rPr lang="en-US" dirty="0"/>
+              <a:t>(I got nothing)</a:t>
+            </a:r>
+          </a:p>
+        </p:txBody>
+      </p:sp>
+    </p:spTree>
+    <p:extLst>
+      <p:ext uri="{BB962C8B-B14F-4D97-AF65-F5344CB8AC3E}">
+        <p14:creationId xmlns:p14="http://schemas.microsoft.com/office/powerpoint/2010/main" val="3444457648"/>
+      </p:ext>
+    </p:extLst>
+  </p:cSld>
+  <p:clrMapOvr>
+    <a:masterClrMapping/>
+  </p:clrMapOvr>
+</p:sld>
+</file>
+
+<file path=ppt/slides/slide11.xml><?xml version="1.0" encoding="utf-8"?>
+<p:sld xmlns:a="http://schemas.openxmlformats.org/drawingml/2006/main" xmlns:r="http://schemas.openxmlformats.org/officeDocument/2006/relationships" xmlns:p="http://schemas.openxmlformats.org/presentationml/2006/main">
+  <p:cSld>
+    <p:spTree>
+      <p:nvGrpSpPr>
+        <p:cNvPr id="1" name=""/>
+        <p:cNvGrpSpPr/>
+        <p:nvPr/>
+      </p:nvGrpSpPr>
+      <p:grpSpPr>
+        <a:xfrm>
+          <a:off x="0" y="0"/>
+          <a:ext cx="0" cy="0"/>
+          <a:chOff x="0" y="0"/>
+          <a:chExt cx="0" cy="0"/>
+        </a:xfrm>
+      </p:grpSpPr>
+      <p:sp>
+        <p:nvSpPr>
+          <p:cNvPr id="4" name="Title 3">
+            <a:extLst>
+              <a:ext uri="{FF2B5EF4-FFF2-40B4-BE49-F238E27FC236}">
+                <a16:creationId xmlns:a16="http://schemas.microsoft.com/office/drawing/2014/main" id="{AD85248D-612B-4648-9DFD-E18DC23056E0}"/>
+              </a:ext>
+            </a:extLst>
+          </p:cNvPr>
+          <p:cNvSpPr>
+            <a:spLocks noGrp="1"/>
+          </p:cNvSpPr>
+          <p:nvPr>
+            <p:ph type="title"/>
+          </p:nvPr>
+        </p:nvSpPr>
+        <p:spPr/>
+        <p:txBody>
+          <a:bodyPr/>
+          <a:lstStyle/>
+          <a:p>
+            <a:r>
+              <a:rPr lang="en-US" dirty="0"/>
+              <a:t>JDK</a:t>
+            </a:r>
+          </a:p>
+        </p:txBody>
+      </p:sp>
+      <p:sp>
+        <p:nvSpPr>
+          <p:cNvPr id="5" name="Content Placeholder 4">
+            <a:extLst>
+              <a:ext uri="{FF2B5EF4-FFF2-40B4-BE49-F238E27FC236}">
+                <a16:creationId xmlns:a16="http://schemas.microsoft.com/office/drawing/2014/main" id="{1BA7633B-0C02-AE45-B063-723C381E0C35}"/>
+              </a:ext>
+            </a:extLst>
+          </p:cNvPr>
+          <p:cNvSpPr>
+            <a:spLocks noGrp="1"/>
+          </p:cNvSpPr>
+          <p:nvPr>
+            <p:ph idx="1"/>
+          </p:nvPr>
+        </p:nvSpPr>
+        <p:spPr/>
+        <p:txBody>
+          <a:bodyPr/>
+          <a:lstStyle/>
+          <a:p>
+            <a:pPr marL="0" indent="0">
+              <a:buNone/>
+            </a:pPr>
+            <a:r>
+              <a:rPr lang="en-US" sz="2800" dirty="0"/>
+              <a:t>Enhancements in a nutshell</a:t>
+            </a:r>
+          </a:p>
+          <a:p>
+            <a:r>
+              <a:rPr lang="en-US" dirty="0"/>
+              <a:t>Reactive streams</a:t>
+            </a:r>
+          </a:p>
+          <a:p>
+            <a:r>
+              <a:rPr lang="en-US" dirty="0"/>
+              <a:t>HTTP client</a:t>
+            </a:r>
+          </a:p>
+          <a:p>
+            <a:r>
+              <a:rPr lang="en-US" dirty="0"/>
+              <a:t>TLS 1.3</a:t>
+            </a:r>
+          </a:p>
+          <a:p>
+            <a:r>
+              <a:rPr lang="en-US" dirty="0"/>
+              <a:t>Removed modules</a:t>
+            </a:r>
+          </a:p>
+          <a:p>
+            <a:r>
+              <a:rPr lang="en-US" dirty="0"/>
+              <a:t>Eliminated modules</a:t>
+            </a:r>
+          </a:p>
+          <a:p>
+            <a:r>
+              <a:rPr lang="en-US" dirty="0"/>
+              <a:t>Reimplemented socket APIs</a:t>
+            </a:r>
+          </a:p>
+          <a:p>
+            <a:r>
+              <a:rPr lang="en-US" dirty="0"/>
+              <a:t>Improved </a:t>
+            </a:r>
+            <a:r>
+              <a:rPr lang="en-US" dirty="0" err="1">
+                <a:latin typeface="Andale Mono" panose="020B0509000000000004" pitchFamily="49" charset="0"/>
+              </a:rPr>
+              <a:t>NullPointerException</a:t>
+            </a:r>
+            <a:endParaRPr lang="en-US" dirty="0"/>
+          </a:p>
+          <a:p>
+            <a:pPr lvl="1"/>
+            <a:endParaRPr lang="en-US" dirty="0"/>
+          </a:p>
+        </p:txBody>
+      </p:sp>
+    </p:spTree>
+    <p:extLst>
+      <p:ext uri="{BB962C8B-B14F-4D97-AF65-F5344CB8AC3E}">
+        <p14:creationId xmlns:p14="http://schemas.microsoft.com/office/powerpoint/2010/main" val="2200234238"/>
+      </p:ext>
+    </p:extLst>
+  </p:cSld>
+  <p:clrMapOvr>
+    <a:masterClrMapping/>
+  </p:clrMapOvr>
+</p:sld>
+</file>
+
+<file path=ppt/slides/slide12.xml><?xml version="1.0" encoding="utf-8"?>
+<p:sld xmlns:a="http://schemas.openxmlformats.org/drawingml/2006/main" xmlns:r="http://schemas.openxmlformats.org/officeDocument/2006/relationships" xmlns:p="http://schemas.openxmlformats.org/presentationml/2006/main">
+  <p:cSld>
+    <p:spTree>
+      <p:nvGrpSpPr>
+        <p:cNvPr id="1" name=""/>
+        <p:cNvGrpSpPr/>
+        <p:nvPr/>
+      </p:nvGrpSpPr>
+      <p:grpSpPr>
+        <a:xfrm>
+          <a:off x="0" y="0"/>
+          <a:ext cx="0" cy="0"/>
+          <a:chOff x="0" y="0"/>
+          <a:chExt cx="0" cy="0"/>
+        </a:xfrm>
+      </p:grpSpPr>
+      <p:sp>
+        <p:nvSpPr>
+          <p:cNvPr id="2" name="Title 1">
+            <a:extLst>
+              <a:ext uri="{FF2B5EF4-FFF2-40B4-BE49-F238E27FC236}">
+                <a16:creationId xmlns:a16="http://schemas.microsoft.com/office/drawing/2014/main" id="{10F4E231-64E8-F949-BCDA-7295645BC91E}"/>
+              </a:ext>
+            </a:extLst>
+          </p:cNvPr>
+          <p:cNvSpPr>
+            <a:spLocks noGrp="1"/>
+          </p:cNvSpPr>
+          <p:nvPr>
+            <p:ph type="title"/>
+          </p:nvPr>
+        </p:nvSpPr>
+        <p:spPr/>
+        <p:txBody>
+          <a:bodyPr/>
+          <a:lstStyle/>
+          <a:p>
+            <a:r>
+              <a:rPr lang="en-US" dirty="0"/>
+              <a:t>Tooling</a:t>
+            </a:r>
+          </a:p>
+        </p:txBody>
+      </p:sp>
+      <p:sp>
+        <p:nvSpPr>
+          <p:cNvPr id="3" name="Text Placeholder 2">
+            <a:extLst>
+              <a:ext uri="{FF2B5EF4-FFF2-40B4-BE49-F238E27FC236}">
+                <a16:creationId xmlns:a16="http://schemas.microsoft.com/office/drawing/2014/main" id="{632E5EDA-A343-5646-B1CE-26239276E194}"/>
+              </a:ext>
+            </a:extLst>
+          </p:cNvPr>
+          <p:cNvSpPr>
+            <a:spLocks noGrp="1"/>
+          </p:cNvSpPr>
+          <p:nvPr>
+            <p:ph type="body" idx="1"/>
+          </p:nvPr>
+        </p:nvSpPr>
+        <p:spPr/>
+        <p:txBody>
+          <a:bodyPr/>
+          <a:lstStyle/>
+          <a:p>
+            <a:r>
+              <a:rPr lang="en-US" dirty="0"/>
+              <a:t>All I see is nails…</a:t>
+            </a:r>
+          </a:p>
+        </p:txBody>
+      </p:sp>
+    </p:spTree>
+    <p:extLst>
+      <p:ext uri="{BB962C8B-B14F-4D97-AF65-F5344CB8AC3E}">
+        <p14:creationId xmlns:p14="http://schemas.microsoft.com/office/powerpoint/2010/main" val="3233494081"/>
+      </p:ext>
+    </p:extLst>
+  </p:cSld>
+  <p:clrMapOvr>
+    <a:masterClrMapping/>
+  </p:clrMapOvr>
+</p:sld>
+</file>
+
+<file path=ppt/slides/slide13.xml><?xml version="1.0" encoding="utf-8"?>
+<p:sld xmlns:a="http://schemas.openxmlformats.org/drawingml/2006/main" xmlns:r="http://schemas.openxmlformats.org/officeDocument/2006/relationships" xmlns:p="http://schemas.openxmlformats.org/presentationml/2006/main">
+  <p:cSld>
+    <p:spTree>
+      <p:nvGrpSpPr>
+        <p:cNvPr id="1" name=""/>
+        <p:cNvGrpSpPr/>
+        <p:nvPr/>
+      </p:nvGrpSpPr>
+      <p:grpSpPr>
+        <a:xfrm>
+          <a:off x="0" y="0"/>
+          <a:ext cx="0" cy="0"/>
+          <a:chOff x="0" y="0"/>
+          <a:chExt cx="0" cy="0"/>
+        </a:xfrm>
+      </p:grpSpPr>
+      <p:sp>
+        <p:nvSpPr>
+          <p:cNvPr id="2" name="Title 1">
+            <a:extLst>
+              <a:ext uri="{FF2B5EF4-FFF2-40B4-BE49-F238E27FC236}">
+                <a16:creationId xmlns:a16="http://schemas.microsoft.com/office/drawing/2014/main" id="{DD15FB73-6050-FE43-9AA4-0455E1523DD3}"/>
+              </a:ext>
+            </a:extLst>
+          </p:cNvPr>
+          <p:cNvSpPr>
+            <a:spLocks noGrp="1"/>
+          </p:cNvSpPr>
+          <p:nvPr>
+            <p:ph type="title"/>
+          </p:nvPr>
+        </p:nvSpPr>
+        <p:spPr/>
+        <p:txBody>
+          <a:bodyPr/>
+          <a:lstStyle/>
+          <a:p>
+            <a:r>
+              <a:rPr lang="en-US" dirty="0"/>
+              <a:t>Tooling</a:t>
+            </a:r>
+          </a:p>
+        </p:txBody>
+      </p:sp>
+      <p:sp>
+        <p:nvSpPr>
+          <p:cNvPr id="3" name="Content Placeholder 2">
+            <a:extLst>
+              <a:ext uri="{FF2B5EF4-FFF2-40B4-BE49-F238E27FC236}">
+                <a16:creationId xmlns:a16="http://schemas.microsoft.com/office/drawing/2014/main" id="{8B3A1929-50CC-724F-B314-500B401D6B27}"/>
+              </a:ext>
+            </a:extLst>
+          </p:cNvPr>
+          <p:cNvSpPr>
+            <a:spLocks noGrp="1"/>
+          </p:cNvSpPr>
+          <p:nvPr>
+            <p:ph idx="1"/>
+          </p:nvPr>
+        </p:nvSpPr>
+        <p:spPr/>
+        <p:txBody>
+          <a:bodyPr/>
+          <a:lstStyle/>
+          <a:p>
+            <a:pPr marL="0" indent="0">
+              <a:buNone/>
+            </a:pPr>
+            <a:r>
+              <a:rPr lang="en-US" sz="2800" dirty="0"/>
+              <a:t>Enhancements in a nutshell:</a:t>
+            </a:r>
+          </a:p>
+          <a:p>
+            <a:r>
+              <a:rPr lang="en-US" dirty="0"/>
+              <a:t>Module system (</a:t>
+            </a:r>
+            <a:r>
+              <a:rPr lang="en-US" dirty="0" err="1">
+                <a:latin typeface="Andale Mono" panose="020B0509000000000004" pitchFamily="49" charset="0"/>
+              </a:rPr>
+              <a:t>jlink</a:t>
+            </a:r>
+            <a:r>
+              <a:rPr lang="en-US" dirty="0"/>
+              <a:t>)</a:t>
+            </a:r>
+          </a:p>
+          <a:p>
+            <a:r>
+              <a:rPr lang="en-US" dirty="0" err="1"/>
+              <a:t>JShell</a:t>
+            </a:r>
+            <a:endParaRPr lang="en-US" dirty="0"/>
+          </a:p>
+          <a:p>
+            <a:r>
+              <a:rPr lang="en-US" dirty="0"/>
+              <a:t>Ahead-of-time compilation (</a:t>
+            </a:r>
+            <a:r>
+              <a:rPr lang="en-US" dirty="0" err="1"/>
+              <a:t>GraalVM</a:t>
+            </a:r>
+            <a:r>
+              <a:rPr lang="en-US" dirty="0"/>
+              <a:t>)</a:t>
+            </a:r>
+          </a:p>
+          <a:p>
+            <a:r>
+              <a:rPr lang="en-US" dirty="0"/>
+              <a:t>Shell scripts</a:t>
+            </a:r>
+          </a:p>
+          <a:p>
+            <a:r>
+              <a:rPr lang="en-US" dirty="0"/>
+              <a:t>Flight Recorder</a:t>
+            </a:r>
+          </a:p>
+          <a:p>
+            <a:endParaRPr lang="en-US" dirty="0"/>
+          </a:p>
+          <a:p>
+            <a:endParaRPr lang="en-US" dirty="0"/>
+          </a:p>
+        </p:txBody>
+      </p:sp>
+    </p:spTree>
+    <p:extLst>
+      <p:ext uri="{BB962C8B-B14F-4D97-AF65-F5344CB8AC3E}">
+        <p14:creationId xmlns:p14="http://schemas.microsoft.com/office/powerpoint/2010/main" val="3959425166"/>
+      </p:ext>
+    </p:extLst>
+  </p:cSld>
+  <p:clrMapOvr>
+    <a:masterClrMapping/>
+  </p:clrMapOvr>
+</p:sld>
+</file>
+
+<file path=ppt/slides/slide14.xml><?xml version="1.0" encoding="utf-8"?>
+<p:sld xmlns:a="http://schemas.openxmlformats.org/drawingml/2006/main" xmlns:r="http://schemas.openxmlformats.org/officeDocument/2006/relationships" xmlns:p="http://schemas.openxmlformats.org/presentationml/2006/main">
+  <p:cSld>
+    <p:spTree>
+      <p:nvGrpSpPr>
+        <p:cNvPr id="1" name=""/>
+        <p:cNvGrpSpPr/>
+        <p:nvPr/>
+      </p:nvGrpSpPr>
+      <p:grpSpPr>
+        <a:xfrm>
+          <a:off x="0" y="0"/>
+          <a:ext cx="0" cy="0"/>
+          <a:chOff x="0" y="0"/>
+          <a:chExt cx="0" cy="0"/>
+        </a:xfrm>
+      </p:grpSpPr>
+      <p:sp>
+        <p:nvSpPr>
+          <p:cNvPr id="2" name="Title 1">
+            <a:extLst>
+              <a:ext uri="{FF2B5EF4-FFF2-40B4-BE49-F238E27FC236}">
+                <a16:creationId xmlns:a16="http://schemas.microsoft.com/office/drawing/2014/main" id="{FB11D81C-3FE5-3C41-B3F1-01D1C3DA1F39}"/>
+              </a:ext>
+            </a:extLst>
+          </p:cNvPr>
+          <p:cNvSpPr>
+            <a:spLocks noGrp="1"/>
+          </p:cNvSpPr>
+          <p:nvPr>
+            <p:ph type="title"/>
+          </p:nvPr>
+        </p:nvSpPr>
+        <p:spPr/>
+        <p:txBody>
+          <a:bodyPr/>
+          <a:lstStyle/>
+          <a:p>
+            <a:r>
+              <a:rPr lang="en-US" dirty="0"/>
+              <a:t>Runtime</a:t>
+            </a:r>
+          </a:p>
+        </p:txBody>
+      </p:sp>
+      <p:sp>
+        <p:nvSpPr>
+          <p:cNvPr id="3" name="Text Placeholder 2">
+            <a:extLst>
+              <a:ext uri="{FF2B5EF4-FFF2-40B4-BE49-F238E27FC236}">
+                <a16:creationId xmlns:a16="http://schemas.microsoft.com/office/drawing/2014/main" id="{42F2DCA3-26EB-F641-8110-D750BECFE0EE}"/>
+              </a:ext>
+            </a:extLst>
+          </p:cNvPr>
+          <p:cNvSpPr>
+            <a:spLocks noGrp="1"/>
+          </p:cNvSpPr>
+          <p:nvPr>
+            <p:ph type="body" idx="1"/>
+          </p:nvPr>
+        </p:nvSpPr>
+        <p:spPr/>
+        <p:txBody>
+          <a:bodyPr/>
+          <a:lstStyle/>
+          <a:p>
+            <a:r>
+              <a:rPr lang="en-US" dirty="0"/>
+              <a:t>Is anyone even reading these?</a:t>
+            </a:r>
+          </a:p>
+        </p:txBody>
+      </p:sp>
+    </p:spTree>
+    <p:extLst>
+      <p:ext uri="{BB962C8B-B14F-4D97-AF65-F5344CB8AC3E}">
+        <p14:creationId xmlns:p14="http://schemas.microsoft.com/office/powerpoint/2010/main" val="1788726277"/>
+      </p:ext>
+    </p:extLst>
+  </p:cSld>
+  <p:clrMapOvr>
+    <a:masterClrMapping/>
+  </p:clrMapOvr>
+</p:sld>
+</file>
+
+<file path=ppt/slides/slide15.xml><?xml version="1.0" encoding="utf-8"?>
+<p:sld xmlns:a="http://schemas.openxmlformats.org/drawingml/2006/main" xmlns:r="http://schemas.openxmlformats.org/officeDocument/2006/relationships" xmlns:p="http://schemas.openxmlformats.org/presentationml/2006/main">
+  <p:cSld>
+    <p:spTree>
+      <p:nvGrpSpPr>
+        <p:cNvPr id="1" name=""/>
+        <p:cNvGrpSpPr/>
+        <p:nvPr/>
+      </p:nvGrpSpPr>
+      <p:grpSpPr>
+        <a:xfrm>
+          <a:off x="0" y="0"/>
+          <a:ext cx="0" cy="0"/>
+          <a:chOff x="0" y="0"/>
+          <a:chExt cx="0" cy="0"/>
+        </a:xfrm>
+      </p:grpSpPr>
+      <p:sp>
+        <p:nvSpPr>
+          <p:cNvPr id="2" name="Title 1">
+            <a:extLst>
+              <a:ext uri="{FF2B5EF4-FFF2-40B4-BE49-F238E27FC236}">
+                <a16:creationId xmlns:a16="http://schemas.microsoft.com/office/drawing/2014/main" id="{0194040D-946A-E84E-868E-57A90F7BC7EE}"/>
+              </a:ext>
+            </a:extLst>
+          </p:cNvPr>
+          <p:cNvSpPr>
+            <a:spLocks noGrp="1"/>
+          </p:cNvSpPr>
+          <p:nvPr>
+            <p:ph type="title"/>
+          </p:nvPr>
+        </p:nvSpPr>
+        <p:spPr/>
+        <p:txBody>
+          <a:bodyPr/>
+          <a:lstStyle/>
+          <a:p>
+            <a:r>
+              <a:rPr lang="en-US" dirty="0"/>
+              <a:t>Runtime</a:t>
+            </a:r>
+          </a:p>
+        </p:txBody>
+      </p:sp>
+      <p:sp>
+        <p:nvSpPr>
+          <p:cNvPr id="3" name="Content Placeholder 2">
+            <a:extLst>
+              <a:ext uri="{FF2B5EF4-FFF2-40B4-BE49-F238E27FC236}">
+                <a16:creationId xmlns:a16="http://schemas.microsoft.com/office/drawing/2014/main" id="{94E8E5AC-DA84-D048-81B0-80C872394362}"/>
+              </a:ext>
+            </a:extLst>
+          </p:cNvPr>
+          <p:cNvSpPr>
+            <a:spLocks noGrp="1"/>
+          </p:cNvSpPr>
+          <p:nvPr>
+            <p:ph idx="1"/>
+          </p:nvPr>
+        </p:nvSpPr>
+        <p:spPr/>
+        <p:txBody>
+          <a:bodyPr/>
+          <a:lstStyle/>
+          <a:p>
+            <a:pPr marL="0" indent="0">
+              <a:buNone/>
+            </a:pPr>
+            <a:r>
+              <a:rPr lang="en-US" sz="2800" dirty="0"/>
+              <a:t>Enhancements in a nutshell:</a:t>
+            </a:r>
+          </a:p>
+          <a:p>
+            <a:r>
+              <a:rPr lang="en-US" dirty="0"/>
+              <a:t>Module system</a:t>
+            </a:r>
+          </a:p>
+          <a:p>
+            <a:r>
+              <a:rPr lang="en-US" dirty="0"/>
+              <a:t>Performance improvements</a:t>
+            </a:r>
+          </a:p>
+          <a:p>
+            <a:pPr lvl="1"/>
+            <a:r>
+              <a:rPr lang="en-US" dirty="0"/>
+              <a:t>Garbage collection</a:t>
+            </a:r>
+          </a:p>
+          <a:p>
+            <a:pPr lvl="1"/>
+            <a:r>
+              <a:rPr lang="en-US" dirty="0"/>
+              <a:t>Thread management</a:t>
+            </a:r>
+          </a:p>
+          <a:p>
+            <a:r>
+              <a:rPr lang="en-US" dirty="0"/>
+              <a:t>Unicode</a:t>
+            </a:r>
+          </a:p>
+          <a:p>
+            <a:r>
+              <a:rPr lang="en-US" dirty="0"/>
+              <a:t>Hidden classes</a:t>
+            </a:r>
+          </a:p>
+          <a:p>
+            <a:endParaRPr lang="en-US" dirty="0"/>
+          </a:p>
+        </p:txBody>
+      </p:sp>
+    </p:spTree>
+    <p:extLst>
+      <p:ext uri="{BB962C8B-B14F-4D97-AF65-F5344CB8AC3E}">
+        <p14:creationId xmlns:p14="http://schemas.microsoft.com/office/powerpoint/2010/main" val="1715626812"/>
+      </p:ext>
+    </p:extLst>
+  </p:cSld>
+  <p:clrMapOvr>
+    <a:masterClrMapping/>
+  </p:clrMapOvr>
+</p:sld>
+</file>
+
+<file path=ppt/slides/slide16.xml><?xml version="1.0" encoding="utf-8"?>
+<p:sld xmlns:a="http://schemas.openxmlformats.org/drawingml/2006/main" xmlns:r="http://schemas.openxmlformats.org/officeDocument/2006/relationships" xmlns:p="http://schemas.openxmlformats.org/presentationml/2006/main">
+  <p:cSld>
+    <p:spTree>
+      <p:nvGrpSpPr>
+        <p:cNvPr id="1" name=""/>
+        <p:cNvGrpSpPr/>
+        <p:nvPr/>
+      </p:nvGrpSpPr>
+      <p:grpSpPr>
+        <a:xfrm>
+          <a:off x="0" y="0"/>
+          <a:ext cx="0" cy="0"/>
+          <a:chOff x="0" y="0"/>
+          <a:chExt cx="0" cy="0"/>
+        </a:xfrm>
+      </p:grpSpPr>
+      <p:sp>
+        <p:nvSpPr>
+          <p:cNvPr id="2" name="Title 1">
+            <a:extLst>
+              <a:ext uri="{FF2B5EF4-FFF2-40B4-BE49-F238E27FC236}">
+                <a16:creationId xmlns:a16="http://schemas.microsoft.com/office/drawing/2014/main" id="{91505F70-37E3-2140-A2FE-EFB1A6910BF1}"/>
+              </a:ext>
+            </a:extLst>
+          </p:cNvPr>
+          <p:cNvSpPr>
+            <a:spLocks noGrp="1"/>
+          </p:cNvSpPr>
+          <p:nvPr>
+            <p:ph type="title"/>
+          </p:nvPr>
+        </p:nvSpPr>
+        <p:spPr/>
+        <p:txBody>
+          <a:bodyPr/>
+          <a:lstStyle/>
+          <a:p>
+            <a:r>
+              <a:rPr lang="en-US" dirty="0"/>
+              <a:t>Epilogue</a:t>
+            </a:r>
+          </a:p>
+        </p:txBody>
+      </p:sp>
+      <p:sp>
+        <p:nvSpPr>
+          <p:cNvPr id="3" name="Text Placeholder 2">
+            <a:extLst>
+              <a:ext uri="{FF2B5EF4-FFF2-40B4-BE49-F238E27FC236}">
+                <a16:creationId xmlns:a16="http://schemas.microsoft.com/office/drawing/2014/main" id="{7770B7A4-B0F4-2D41-8D2B-ED01CFDC1AF9}"/>
+              </a:ext>
+            </a:extLst>
+          </p:cNvPr>
+          <p:cNvSpPr>
+            <a:spLocks noGrp="1"/>
+          </p:cNvSpPr>
+          <p:nvPr>
+            <p:ph type="body" idx="1"/>
+          </p:nvPr>
+        </p:nvSpPr>
+        <p:spPr/>
+        <p:txBody>
+          <a:bodyPr/>
+          <a:lstStyle/>
+          <a:p>
+            <a:r>
+              <a:rPr lang="en-US" dirty="0"/>
+              <a:t>To summarize, in conclusion, wrapping up…</a:t>
+            </a:r>
+          </a:p>
+        </p:txBody>
+      </p:sp>
+    </p:spTree>
+    <p:extLst>
+      <p:ext uri="{BB962C8B-B14F-4D97-AF65-F5344CB8AC3E}">
+        <p14:creationId xmlns:p14="http://schemas.microsoft.com/office/powerpoint/2010/main" val="451421855"/>
+      </p:ext>
+    </p:extLst>
+  </p:cSld>
+  <p:clrMapOvr>
+    <a:masterClrMapping/>
+  </p:clrMapOvr>
+</p:sld>
+</file>
+
+<file path=ppt/slides/slide17.xml><?xml version="1.0" encoding="utf-8"?>
+<p:sld xmlns:a="http://schemas.openxmlformats.org/drawingml/2006/main" xmlns:r="http://schemas.openxmlformats.org/officeDocument/2006/relationships" xmlns:p="http://schemas.openxmlformats.org/presentationml/2006/main">
+  <p:cSld>
+    <p:spTree>
+      <p:nvGrpSpPr>
+        <p:cNvPr id="1" name=""/>
+        <p:cNvGrpSpPr/>
+        <p:nvPr/>
+      </p:nvGrpSpPr>
+      <p:grpSpPr>
+        <a:xfrm>
+          <a:off x="0" y="0"/>
+          <a:ext cx="0" cy="0"/>
+          <a:chOff x="0" y="0"/>
+          <a:chExt cx="0" cy="0"/>
+        </a:xfrm>
+      </p:grpSpPr>
+      <p:sp>
+        <p:nvSpPr>
+          <p:cNvPr id="4" name="Title 3">
+            <a:extLst>
+              <a:ext uri="{FF2B5EF4-FFF2-40B4-BE49-F238E27FC236}">
+                <a16:creationId xmlns:a16="http://schemas.microsoft.com/office/drawing/2014/main" id="{6CBBC6F6-61AD-2E41-A321-FB8754970219}"/>
+              </a:ext>
+            </a:extLst>
+          </p:cNvPr>
+          <p:cNvSpPr>
+            <a:spLocks noGrp="1"/>
+          </p:cNvSpPr>
+          <p:nvPr>
+            <p:ph type="title"/>
+          </p:nvPr>
+        </p:nvSpPr>
+        <p:spPr/>
+        <p:txBody>
+          <a:bodyPr/>
+          <a:lstStyle/>
+          <a:p>
+            <a:r>
+              <a:rPr lang="en-US" dirty="0"/>
+              <a:t>Epilogue</a:t>
+            </a:r>
+          </a:p>
+        </p:txBody>
+      </p:sp>
+      <p:sp>
+        <p:nvSpPr>
+          <p:cNvPr id="5" name="Content Placeholder 4">
+            <a:extLst>
+              <a:ext uri="{FF2B5EF4-FFF2-40B4-BE49-F238E27FC236}">
+                <a16:creationId xmlns:a16="http://schemas.microsoft.com/office/drawing/2014/main" id="{D77A2A44-0514-F947-B3D4-D6C779EFEEAF}"/>
+              </a:ext>
+            </a:extLst>
+          </p:cNvPr>
+          <p:cNvSpPr>
+            <a:spLocks noGrp="1"/>
+          </p:cNvSpPr>
+          <p:nvPr>
+            <p:ph idx="1"/>
+          </p:nvPr>
+        </p:nvSpPr>
+        <p:spPr/>
+        <p:txBody>
+          <a:bodyPr/>
+          <a:lstStyle/>
+          <a:p>
+            <a:endParaRPr lang="en-US" dirty="0"/>
+          </a:p>
+        </p:txBody>
+      </p:sp>
+    </p:spTree>
+    <p:extLst>
+      <p:ext uri="{BB962C8B-B14F-4D97-AF65-F5344CB8AC3E}">
+        <p14:creationId xmlns:p14="http://schemas.microsoft.com/office/powerpoint/2010/main" val="307077593"/>
+      </p:ext>
+    </p:extLst>
+  </p:cSld>
+  <p:clrMapOvr>
+    <a:masterClrMapping/>
+  </p:clrMapOvr>
+  <mc:AlternateContent xmlns:mc="http://schemas.openxmlformats.org/markup-compatibility/2006" xmlns:p159="http://schemas.microsoft.com/office/powerpoint/2015/09/main">
+    <mc:Choice Requires="p159">
+      <p:transition spd="slow">
+        <p159:morph option="byObject"/>
+      </p:transition>
+    </mc:Choice>
+    <mc:Fallback xmlns="">
+      <p:transition spd="slow">
+        <p:fade/>
+      </p:transition>
+    </mc:Fallback>
+  </mc:AlternateContent>
+  <p:timing>
+    <p:tnLst>
+      <p:par>
+        <p:cTn id="1" dur="indefinite" restart="never" nodeType="tmRoot">
+          <p:childTnLst>
+            <p:seq concurrent="1" nextAc="seek">
+              <p:cTn id="2" dur="indefinite" nodeType="mainSeq">
+                <p:childTnLst>
+                  <p:par>
+                    <p:cTn id="3" fill="hold">
+                      <p:stCondLst>
+                        <p:cond delay="indefinite"/>
+                      </p:stCondLst>
+                      <p:childTnLst>
+                        <p:par>
+                          <p:cTn id="4" fill="hold">
+                            <p:stCondLst>
+                              <p:cond delay="0"/>
+                            </p:stCondLst>
+                            <p:childTnLst>
+                              <p:par>
+                                <p:cTn id="5" presetID="2" presetClass="entr" presetSubtype="4" fill="hold" grpId="0" nodeType="clickEffect" nodePh="1">
+                                  <p:stCondLst>
+                                    <p:cond delay="0"/>
+                                  </p:stCondLst>
+                                  <p:endCondLst>
+                                    <p:cond evt="begin" delay="0">
+                                      <p:tn val="5"/>
+                                    </p:cond>
+                                  </p:endCondLst>
+                                  <p:childTnLst>
+                                    <p:set>
+                                      <p:cBhvr>
+                                        <p:cTn id="6" dur="1" fill="hold">
+                                          <p:stCondLst>
+                                            <p:cond delay="0"/>
+                                          </p:stCondLst>
+                                        </p:cTn>
+                                        <p:tgtEl>
+                                          <p:spTgt spid="5">
+                                            <p:txEl>
+                                              <p:pRg st="0" end="0"/>
+                                            </p:txEl>
+                                          </p:spTgt>
+                                        </p:tgtEl>
+                                        <p:attrNameLst>
+                                          <p:attrName>style.visibility</p:attrName>
+                                        </p:attrNameLst>
+                                      </p:cBhvr>
+                                      <p:to>
+                                        <p:strVal val="visible"/>
+                                      </p:to>
+                                    </p:set>
+                                    <p:anim calcmode="lin" valueType="num">
+                                      <p:cBhvr additive="base">
+                                        <p:cTn id="7" dur="500" fill="hold"/>
+                                        <p:tgtEl>
+                                          <p:spTgt spid="5">
+                                            <p:txEl>
+                                              <p:pRg st="0" end="0"/>
+                                            </p:txEl>
+                                          </p:spTgt>
+                                        </p:tgtEl>
+                                        <p:attrNameLst>
+                                          <p:attrName>ppt_x</p:attrName>
+                                        </p:attrNameLst>
+                                      </p:cBhvr>
+                                      <p:tavLst>
+                                        <p:tav tm="0">
+                                          <p:val>
+                                            <p:strVal val="#ppt_x"/>
+                                          </p:val>
+                                        </p:tav>
+                                        <p:tav tm="100000">
+                                          <p:val>
+                                            <p:strVal val="#ppt_x"/>
+                                          </p:val>
+                                        </p:tav>
+                                      </p:tavLst>
+                                    </p:anim>
+                                    <p:anim calcmode="lin" valueType="num">
+                                      <p:cBhvr additive="base">
+                                        <p:cTn id="8" dur="500" fill="hold"/>
+                                        <p:tgtEl>
+                                          <p:spTgt spid="5">
+                                            <p:txEl>
+                                              <p:pRg st="0" end="0"/>
+                                            </p:txEl>
+                                          </p:spTgt>
+                                        </p:tgtEl>
+                                        <p:attrNameLst>
+                                          <p:attrName>ppt_y</p:attrName>
+                                        </p:attrNameLst>
+                                      </p:cBhvr>
+                                      <p:tavLst>
+                                        <p:tav tm="0">
+                                          <p:val>
+                                            <p:strVal val="1+#ppt_h/2"/>
+                                          </p:val>
+                                        </p:tav>
+                                        <p:tav tm="100000">
+                                          <p:val>
+                                            <p:strVal val="#ppt_y"/>
+                                          </p:val>
+                                        </p:tav>
+                                      </p:tavLst>
+                                    </p:anim>
+                                  </p:childTnLst>
+                                </p:cTn>
+                              </p:par>
+                            </p:childTnLst>
+                          </p:cTn>
+                        </p:par>
+                      </p:childTnLst>
+                    </p:cTn>
+                  </p:par>
+                </p:childTnLst>
+              </p:cTn>
+              <p:prevCondLst>
+                <p:cond evt="onPrev" delay="0">
+                  <p:tgtEl>
+                    <p:sldTgt/>
+                  </p:tgtEl>
+                </p:cond>
+              </p:prevCondLst>
+              <p:nextCondLst>
+                <p:cond evt="onNext" delay="0">
+                  <p:tgtEl>
+                    <p:sldTgt/>
+                  </p:tgtEl>
+                </p:cond>
+              </p:nextCondLst>
+            </p:seq>
+          </p:childTnLst>
+        </p:cTn>
+      </p:par>
+    </p:tnLst>
+    <p:bldLst>
+      <p:bldP spid="5" grpId="0" uiExpand="1" build="p"/>
+    </p:bldLst>
+  </p:timing>
+</p:sld>
+</file>
+
+<file path=ppt/slides/slide18.xml><?xml version="1.0" encoding="utf-8"?>
+<p:sld xmlns:a="http://schemas.openxmlformats.org/drawingml/2006/main" xmlns:r="http://schemas.openxmlformats.org/officeDocument/2006/relationships" xmlns:p="http://schemas.openxmlformats.org/presentationml/2006/main">
+  <p:cSld>
+    <p:spTree>
+      <p:nvGrpSpPr>
+        <p:cNvPr id="1" name=""/>
+        <p:cNvGrpSpPr/>
+        <p:nvPr/>
+      </p:nvGrpSpPr>
+      <p:grpSpPr>
+        <a:xfrm>
+          <a:off x="0" y="0"/>
+          <a:ext cx="0" cy="0"/>
+          <a:chOff x="0" y="0"/>
+          <a:chExt cx="0" cy="0"/>
+        </a:xfrm>
+      </p:grpSpPr>
+      <p:pic>
+        <p:nvPicPr>
+          <p:cNvPr id="1030" name="Picture 6">
+            <a:extLst>
+              <a:ext uri="{FF2B5EF4-FFF2-40B4-BE49-F238E27FC236}">
+                <a16:creationId xmlns:a16="http://schemas.microsoft.com/office/drawing/2014/main" id="{92155237-FDEF-4141-B4CC-5270E6A5FB37}"/>
+              </a:ext>
+            </a:extLst>
+          </p:cNvPr>
+          <p:cNvPicPr>
+            <a:picLocks noChangeAspect="1" noChangeArrowheads="1"/>
+          </p:cNvPicPr>
+          <p:nvPr/>
+        </p:nvPicPr>
+        <p:blipFill rotWithShape="1">
+          <a:blip r:embed="rId3">
+            <a:alphaModFix amt="35000"/>
+            <a:extLst>
+              <a:ext uri="{28A0092B-C50C-407E-A947-70E740481C1C}">
+                <a14:useLocalDpi xmlns:a14="http://schemas.microsoft.com/office/drawing/2010/main" val="0"/>
+              </a:ext>
+            </a:extLst>
+          </a:blip>
+          <a:srcRect/>
+          <a:stretch/>
+        </p:blipFill>
+        <p:spPr bwMode="auto">
+          <a:xfrm>
+            <a:off x="20" y="10"/>
+            <a:ext cx="12191980" cy="6857990"/>
+          </a:xfrm>
+          <a:prstGeom prst="rect">
+            <a:avLst/>
+          </a:prstGeom>
+          <a:noFill/>
+          <a:extLst>
+            <a:ext uri="{909E8E84-426E-40DD-AFC4-6F175D3DCCD1}">
+              <a14:hiddenFill xmlns:a14="http://schemas.microsoft.com/office/drawing/2010/main">
+                <a:solidFill>
+                  <a:srgbClr val="FFFFFF"/>
+                </a:solidFill>
+              </a14:hiddenFill>
+            </a:ext>
+          </a:extLst>
+        </p:spPr>
+      </p:pic>
+      <p:sp>
+        <p:nvSpPr>
+          <p:cNvPr id="2" name="Title 1">
+            <a:extLst>
+              <a:ext uri="{FF2B5EF4-FFF2-40B4-BE49-F238E27FC236}">
+                <a16:creationId xmlns:a16="http://schemas.microsoft.com/office/drawing/2014/main" id="{65887394-FE68-CE44-9EC6-15DF5B2987C4}"/>
+              </a:ext>
+            </a:extLst>
+          </p:cNvPr>
+          <p:cNvSpPr>
+            <a:spLocks noGrp="1"/>
+          </p:cNvSpPr>
+          <p:nvPr>
+            <p:ph type="title"/>
+          </p:nvPr>
+        </p:nvSpPr>
+        <p:spPr>
+          <a:xfrm>
+            <a:off x="3962399" y="1964267"/>
+            <a:ext cx="7197726" cy="2421464"/>
+          </a:xfrm>
+        </p:spPr>
+        <p:txBody>
+          <a:bodyPr vert="horz" lIns="91440" tIns="45720" rIns="91440" bIns="45720" rtlCol="0" anchor="b">
+            <a:normAutofit/>
+          </a:bodyPr>
+          <a:lstStyle/>
+          <a:p>
+            <a:pPr algn="r"/>
+            <a:r>
+              <a:rPr lang="en-US" sz="4800" dirty="0"/>
+              <a:t>Q &amp; A</a:t>
+            </a:r>
+          </a:p>
+        </p:txBody>
+      </p:sp>
+      <p:sp>
+        <p:nvSpPr>
+          <p:cNvPr id="4" name="Text Placeholder 3">
+            <a:extLst>
+              <a:ext uri="{FF2B5EF4-FFF2-40B4-BE49-F238E27FC236}">
+                <a16:creationId xmlns:a16="http://schemas.microsoft.com/office/drawing/2014/main" id="{8F7A21A3-4257-6B4A-A93C-266B0C86D012}"/>
+              </a:ext>
+            </a:extLst>
+          </p:cNvPr>
+          <p:cNvSpPr>
+            <a:spLocks noGrp="1"/>
+          </p:cNvSpPr>
+          <p:nvPr>
+            <p:ph type="body" idx="1"/>
+          </p:nvPr>
+        </p:nvSpPr>
+        <p:spPr>
+          <a:xfrm>
+            <a:off x="3962399" y="4385732"/>
+            <a:ext cx="7197726" cy="1405467"/>
+          </a:xfrm>
+        </p:spPr>
+        <p:txBody>
+          <a:bodyPr vert="horz" lIns="91440" tIns="45720" rIns="91440" bIns="45720" rtlCol="0" anchor="t">
+            <a:normAutofit/>
+          </a:bodyPr>
+          <a:lstStyle/>
+          <a:p>
+            <a:pPr algn="r"/>
+            <a:endParaRPr lang="en-US" sz="1800" dirty="0"/>
+          </a:p>
+        </p:txBody>
+      </p:sp>
+    </p:spTree>
+    <p:extLst>
+      <p:ext uri="{BB962C8B-B14F-4D97-AF65-F5344CB8AC3E}">
+        <p14:creationId xmlns:p14="http://schemas.microsoft.com/office/powerpoint/2010/main" val="1588320417"/>
+      </p:ext>
+    </p:extLst>
+  </p:cSld>
+  <p:clrMapOvr>
+    <a:masterClrMapping/>
+  </p:clrMapOvr>
+</p:sld>
+</file>
+
+<file path=ppt/slides/slide2.xml><?xml version="1.0" encoding="utf-8"?>
+<p:sld xmlns:a="http://schemas.openxmlformats.org/drawingml/2006/main" xmlns:r="http://schemas.openxmlformats.org/officeDocument/2006/relationships" xmlns:p="http://schemas.openxmlformats.org/presentationml/2006/main">
+  <p:cSld>
+    <p:spTree>
+      <p:nvGrpSpPr>
+        <p:cNvPr id="1" name=""/>
+        <p:cNvGrpSpPr/>
+        <p:nvPr/>
+      </p:nvGrpSpPr>
+      <p:grpSpPr>
+        <a:xfrm>
+          <a:off x="0" y="0"/>
+          <a:ext cx="0" cy="0"/>
+          <a:chOff x="0" y="0"/>
+          <a:chExt cx="0" cy="0"/>
+        </a:xfrm>
+      </p:grpSpPr>
+      <p:sp>
+        <p:nvSpPr>
+          <p:cNvPr id="2" name="Title 1">
+            <a:extLst>
+              <a:ext uri="{FF2B5EF4-FFF2-40B4-BE49-F238E27FC236}">
+                <a16:creationId xmlns:a16="http://schemas.microsoft.com/office/drawing/2014/main" id="{946C17B9-D90B-494D-800C-47F79A9FD3C3}"/>
+              </a:ext>
+            </a:extLst>
+          </p:cNvPr>
+          <p:cNvSpPr>
+            <a:spLocks noGrp="1"/>
+          </p:cNvSpPr>
+          <p:nvPr>
+            <p:ph type="title"/>
+          </p:nvPr>
+        </p:nvSpPr>
+        <p:spPr/>
+        <p:txBody>
+          <a:bodyPr/>
+          <a:lstStyle/>
+          <a:p>
+            <a:r>
+              <a:rPr lang="en-US" dirty="0"/>
+              <a:t>Intro</a:t>
+            </a:r>
+          </a:p>
+        </p:txBody>
+      </p:sp>
+      <p:sp>
+        <p:nvSpPr>
+          <p:cNvPr id="3" name="Text Placeholder 2">
+            <a:extLst>
+              <a:ext uri="{FF2B5EF4-FFF2-40B4-BE49-F238E27FC236}">
+                <a16:creationId xmlns:a16="http://schemas.microsoft.com/office/drawing/2014/main" id="{72FECDC8-ECC1-C84D-9106-911BBEE2E474}"/>
+              </a:ext>
+            </a:extLst>
+          </p:cNvPr>
+          <p:cNvSpPr>
+            <a:spLocks noGrp="1"/>
+          </p:cNvSpPr>
+          <p:nvPr>
+            <p:ph type="body" idx="1"/>
+          </p:nvPr>
+        </p:nvSpPr>
+        <p:spPr/>
+        <p:txBody>
+          <a:bodyPr/>
+          <a:lstStyle/>
+          <a:p>
+            <a:endParaRPr lang="en-US"/>
+          </a:p>
+        </p:txBody>
+      </p:sp>
+    </p:spTree>
+    <p:extLst>
+      <p:ext uri="{BB962C8B-B14F-4D97-AF65-F5344CB8AC3E}">
+        <p14:creationId xmlns:p14="http://schemas.microsoft.com/office/powerpoint/2010/main" val="2896982049"/>
+      </p:ext>
+    </p:extLst>
+  </p:cSld>
+  <p:clrMapOvr>
+    <a:masterClrMapping/>
+  </p:clrMapOvr>
+</p:sld>
+</file>
+
+<file path=ppt/slides/slide3.xml><?xml version="1.0" encoding="utf-8"?>
+<p:sld xmlns:a="http://schemas.openxmlformats.org/drawingml/2006/main" xmlns:r="http://schemas.openxmlformats.org/officeDocument/2006/relationships" xmlns:p="http://schemas.openxmlformats.org/presentationml/2006/main">
+  <p:cSld>
+    <p:spTree>
+      <p:nvGrpSpPr>
+        <p:cNvPr id="1" name=""/>
+        <p:cNvGrpSpPr/>
+        <p:nvPr/>
+      </p:nvGrpSpPr>
+      <p:grpSpPr>
+        <a:xfrm>
+          <a:off x="0" y="0"/>
+          <a:ext cx="0" cy="0"/>
+          <a:chOff x="0" y="0"/>
+          <a:chExt cx="0" cy="0"/>
+        </a:xfrm>
+      </p:grpSpPr>
+      <p:sp>
+        <p:nvSpPr>
+          <p:cNvPr id="2" name="Title 1">
+            <a:extLst>
+              <a:ext uri="{FF2B5EF4-FFF2-40B4-BE49-F238E27FC236}">
+                <a16:creationId xmlns:a16="http://schemas.microsoft.com/office/drawing/2014/main" id="{935E847A-DEE9-0A41-818F-097164892593}"/>
+              </a:ext>
+            </a:extLst>
+          </p:cNvPr>
+          <p:cNvSpPr>
+            <a:spLocks noGrp="1"/>
+          </p:cNvSpPr>
+          <p:nvPr>
+            <p:ph type="title"/>
+          </p:nvPr>
+        </p:nvSpPr>
+        <p:spPr/>
+        <p:txBody>
+          <a:bodyPr/>
+          <a:lstStyle/>
+          <a:p>
+            <a:r>
+              <a:rPr lang="en-US" dirty="0"/>
+              <a:t>Intro</a:t>
+            </a:r>
+          </a:p>
+        </p:txBody>
+      </p:sp>
+      <p:sp>
+        <p:nvSpPr>
+          <p:cNvPr id="3" name="Content Placeholder 2">
+            <a:extLst>
+              <a:ext uri="{FF2B5EF4-FFF2-40B4-BE49-F238E27FC236}">
+                <a16:creationId xmlns:a16="http://schemas.microsoft.com/office/drawing/2014/main" id="{802C7D51-D68F-564E-9BD9-873BE177B23C}"/>
+              </a:ext>
+            </a:extLst>
+          </p:cNvPr>
+          <p:cNvSpPr>
+            <a:spLocks noGrp="1"/>
+          </p:cNvSpPr>
+          <p:nvPr>
+            <p:ph idx="1"/>
+          </p:nvPr>
+        </p:nvSpPr>
+        <p:spPr/>
+        <p:txBody>
+          <a:bodyPr/>
+          <a:lstStyle/>
+          <a:p>
+            <a:r>
+              <a:rPr lang="en-US" dirty="0"/>
+              <a:t>Java 10 was the first of the bi-annual releases</a:t>
+            </a:r>
+          </a:p>
+          <a:p>
+            <a:r>
+              <a:rPr lang="en-US" dirty="0"/>
+              <a:t>Six-month release cycle means less time for “big” changes</a:t>
+            </a:r>
+          </a:p>
+          <a:p>
+            <a:pPr lvl="1"/>
+            <a:r>
+              <a:rPr lang="en-US" dirty="0"/>
+              <a:t>Java 9 started introducing experimental &amp; preview features</a:t>
+            </a:r>
+          </a:p>
+          <a:p>
+            <a:pPr lvl="1"/>
+            <a:r>
+              <a:rPr lang="en-US" dirty="0"/>
+              <a:t>Generally used 2 releases to get community feedback before being finalized as a standard</a:t>
+            </a:r>
+          </a:p>
+        </p:txBody>
+      </p:sp>
+    </p:spTree>
+    <p:extLst>
+      <p:ext uri="{BB962C8B-B14F-4D97-AF65-F5344CB8AC3E}">
+        <p14:creationId xmlns:p14="http://schemas.microsoft.com/office/powerpoint/2010/main" val="1007651996"/>
+      </p:ext>
+    </p:extLst>
+  </p:cSld>
+  <p:clrMapOvr>
+    <a:masterClrMapping/>
+  </p:clrMapOvr>
+</p:sld>
+</file>
+
+<file path=ppt/slides/slide4.xml><?xml version="1.0" encoding="utf-8"?>
+<p:sld xmlns:a="http://schemas.openxmlformats.org/drawingml/2006/main" xmlns:r="http://schemas.openxmlformats.org/officeDocument/2006/relationships" xmlns:p="http://schemas.openxmlformats.org/presentationml/2006/main">
+  <p:cSld>
+    <p:spTree>
+      <p:nvGrpSpPr>
+        <p:cNvPr id="1" name=""/>
+        <p:cNvGrpSpPr/>
+        <p:nvPr/>
+      </p:nvGrpSpPr>
+      <p:grpSpPr>
+        <a:xfrm>
+          <a:off x="0" y="0"/>
+          <a:ext cx="0" cy="0"/>
+          <a:chOff x="0" y="0"/>
+          <a:chExt cx="0" cy="0"/>
+        </a:xfrm>
+      </p:grpSpPr>
+      <p:sp>
+        <p:nvSpPr>
+          <p:cNvPr id="2" name="Title 1">
+            <a:extLst>
+              <a:ext uri="{FF2B5EF4-FFF2-40B4-BE49-F238E27FC236}">
+                <a16:creationId xmlns:a16="http://schemas.microsoft.com/office/drawing/2014/main" id="{E61D9FCE-34DE-4D49-AD64-CD98472F3E35}"/>
+              </a:ext>
+            </a:extLst>
+          </p:cNvPr>
+          <p:cNvSpPr>
+            <a:spLocks noGrp="1"/>
+          </p:cNvSpPr>
+          <p:nvPr>
+            <p:ph type="title"/>
+          </p:nvPr>
+        </p:nvSpPr>
+        <p:spPr/>
+        <p:txBody>
+          <a:bodyPr/>
+          <a:lstStyle/>
+          <a:p>
+            <a:r>
+              <a:rPr lang="en-US" dirty="0"/>
+              <a:t>Language Changes</a:t>
+            </a:r>
+          </a:p>
+        </p:txBody>
+      </p:sp>
+      <p:sp>
+        <p:nvSpPr>
+          <p:cNvPr id="3" name="Text Placeholder 2">
+            <a:extLst>
+              <a:ext uri="{FF2B5EF4-FFF2-40B4-BE49-F238E27FC236}">
+                <a16:creationId xmlns:a16="http://schemas.microsoft.com/office/drawing/2014/main" id="{5361484F-8390-8649-9A00-0158013EDD27}"/>
+              </a:ext>
+            </a:extLst>
+          </p:cNvPr>
+          <p:cNvSpPr>
+            <a:spLocks noGrp="1"/>
+          </p:cNvSpPr>
+          <p:nvPr>
+            <p:ph type="body" idx="1"/>
+          </p:nvPr>
+        </p:nvSpPr>
+        <p:spPr/>
+        <p:txBody>
+          <a:bodyPr/>
+          <a:lstStyle/>
+          <a:p>
+            <a:r>
+              <a:rPr lang="en-US" dirty="0" err="1"/>
+              <a:t>Parlez</a:t>
+            </a:r>
+            <a:r>
+              <a:rPr lang="en-US" dirty="0"/>
+              <a:t> </a:t>
+            </a:r>
+            <a:r>
+              <a:rPr lang="en-US" dirty="0" err="1"/>
+              <a:t>vous</a:t>
+            </a:r>
+            <a:r>
+              <a:rPr lang="en-US" dirty="0"/>
+              <a:t> Java?</a:t>
+            </a:r>
+          </a:p>
+        </p:txBody>
+      </p:sp>
+    </p:spTree>
+    <p:extLst>
+      <p:ext uri="{BB962C8B-B14F-4D97-AF65-F5344CB8AC3E}">
+        <p14:creationId xmlns:p14="http://schemas.microsoft.com/office/powerpoint/2010/main" val="1235761972"/>
+      </p:ext>
+    </p:extLst>
+  </p:cSld>
+  <p:clrMapOvr>
+    <a:masterClrMapping/>
+  </p:clrMapOvr>
+</p:sld>
+</file>
+
+<file path=ppt/slides/slide5.xml><?xml version="1.0" encoding="utf-8"?>
+<p:sld xmlns:a="http://schemas.openxmlformats.org/drawingml/2006/main" xmlns:r="http://schemas.openxmlformats.org/officeDocument/2006/relationships" xmlns:p="http://schemas.openxmlformats.org/presentationml/2006/main">
+  <p:cSld>
+    <p:spTree>
+      <p:nvGrpSpPr>
+        <p:cNvPr id="1" name=""/>
+        <p:cNvGrpSpPr/>
+        <p:nvPr/>
+      </p:nvGrpSpPr>
+      <p:grpSpPr>
+        <a:xfrm>
+          <a:off x="0" y="0"/>
+          <a:ext cx="0" cy="0"/>
+          <a:chOff x="0" y="0"/>
+          <a:chExt cx="0" cy="0"/>
+        </a:xfrm>
+      </p:grpSpPr>
+      <p:sp>
+        <p:nvSpPr>
+          <p:cNvPr id="2" name="Title 1">
+            <a:extLst>
+              <a:ext uri="{FF2B5EF4-FFF2-40B4-BE49-F238E27FC236}">
+                <a16:creationId xmlns:a16="http://schemas.microsoft.com/office/drawing/2014/main" id="{D549CB59-A0E4-4146-B5C8-6B12AC073354}"/>
+              </a:ext>
+            </a:extLst>
+          </p:cNvPr>
+          <p:cNvSpPr>
+            <a:spLocks noGrp="1"/>
+          </p:cNvSpPr>
+          <p:nvPr>
+            <p:ph type="title"/>
+          </p:nvPr>
+        </p:nvSpPr>
+        <p:spPr/>
+        <p:txBody>
+          <a:bodyPr/>
+          <a:lstStyle/>
+          <a:p>
+            <a:r>
+              <a:rPr lang="en-US" dirty="0"/>
+              <a:t>Language Changes</a:t>
+            </a:r>
+          </a:p>
+        </p:txBody>
+      </p:sp>
+      <p:sp>
+        <p:nvSpPr>
+          <p:cNvPr id="3" name="Content Placeholder 2">
+            <a:extLst>
+              <a:ext uri="{FF2B5EF4-FFF2-40B4-BE49-F238E27FC236}">
+                <a16:creationId xmlns:a16="http://schemas.microsoft.com/office/drawing/2014/main" id="{0A45A632-1493-F449-BAB9-460406D2C3DB}"/>
+              </a:ext>
+            </a:extLst>
+          </p:cNvPr>
+          <p:cNvSpPr>
+            <a:spLocks noGrp="1"/>
+          </p:cNvSpPr>
+          <p:nvPr>
+            <p:ph idx="1"/>
+          </p:nvPr>
+        </p:nvSpPr>
+        <p:spPr/>
+        <p:txBody>
+          <a:bodyPr>
+            <a:normAutofit fontScale="92500" lnSpcReduction="20000"/>
+          </a:bodyPr>
+          <a:lstStyle/>
+          <a:p>
+            <a:pPr marL="0" indent="0">
+              <a:buNone/>
+            </a:pPr>
+            <a:r>
+              <a:rPr lang="en-US" sz="2800" dirty="0"/>
+              <a:t>Enhancements in a nutshell:</a:t>
+            </a:r>
+          </a:p>
+          <a:p>
+            <a:r>
+              <a:rPr lang="en-US" dirty="0"/>
+              <a:t>Module system</a:t>
+            </a:r>
+          </a:p>
+          <a:p>
+            <a:r>
+              <a:rPr lang="en-US" dirty="0"/>
+              <a:t>Private interface methods</a:t>
+            </a:r>
+          </a:p>
+          <a:p>
+            <a:r>
+              <a:rPr lang="en-US" dirty="0"/>
+              <a:t>Type inference</a:t>
+            </a:r>
+          </a:p>
+          <a:p>
+            <a:r>
+              <a:rPr lang="en-US" dirty="0"/>
+              <a:t>“Effectively final” in try-with-resources</a:t>
+            </a:r>
+          </a:p>
+          <a:p>
+            <a:r>
+              <a:rPr lang="en-US" dirty="0"/>
+              <a:t>Text blocks</a:t>
+            </a:r>
+          </a:p>
+          <a:p>
+            <a:r>
+              <a:rPr lang="en-US" dirty="0"/>
+              <a:t>Switch expressions</a:t>
+            </a:r>
+          </a:p>
+          <a:p>
+            <a:r>
+              <a:rPr lang="en-US" dirty="0"/>
+              <a:t>Pattern matching</a:t>
+            </a:r>
+          </a:p>
+          <a:p>
+            <a:r>
+              <a:rPr lang="en-US" dirty="0"/>
+              <a:t>Record classes</a:t>
+            </a:r>
+          </a:p>
+          <a:p>
+            <a:r>
+              <a:rPr lang="en-US" dirty="0"/>
+              <a:t>Sealed classes</a:t>
+            </a:r>
+          </a:p>
+        </p:txBody>
+      </p:sp>
+    </p:spTree>
+    <p:extLst>
+      <p:ext uri="{BB962C8B-B14F-4D97-AF65-F5344CB8AC3E}">
+        <p14:creationId xmlns:p14="http://schemas.microsoft.com/office/powerpoint/2010/main" val="2948442141"/>
+      </p:ext>
+    </p:extLst>
+  </p:cSld>
+  <p:clrMapOvr>
+    <a:masterClrMapping/>
+  </p:clrMapOvr>
+</p:sld>
+</file>
+
+<file path=ppt/slides/slide6.xml><?xml version="1.0" encoding="utf-8"?>
+<p:sld xmlns:a="http://schemas.openxmlformats.org/drawingml/2006/main" xmlns:r="http://schemas.openxmlformats.org/officeDocument/2006/relationships" xmlns:p="http://schemas.openxmlformats.org/presentationml/2006/main">
+  <p:cSld>
+    <p:spTree>
+      <p:nvGrpSpPr>
+        <p:cNvPr id="1" name=""/>
+        <p:cNvGrpSpPr/>
+        <p:nvPr/>
+      </p:nvGrpSpPr>
+      <p:grpSpPr>
+        <a:xfrm>
+          <a:off x="0" y="0"/>
+          <a:ext cx="0" cy="0"/>
+          <a:chOff x="0" y="0"/>
+          <a:chExt cx="0" cy="0"/>
+        </a:xfrm>
+      </p:grpSpPr>
+      <p:sp>
+        <p:nvSpPr>
+          <p:cNvPr id="2" name="Title 1">
+            <a:extLst>
+              <a:ext uri="{FF2B5EF4-FFF2-40B4-BE49-F238E27FC236}">
+                <a16:creationId xmlns:a16="http://schemas.microsoft.com/office/drawing/2014/main" id="{C2052CE5-F69A-D645-8ECD-5C44E4A30D5C}"/>
+              </a:ext>
+            </a:extLst>
+          </p:cNvPr>
+          <p:cNvSpPr>
+            <a:spLocks noGrp="1"/>
+          </p:cNvSpPr>
+          <p:nvPr>
+            <p:ph type="title"/>
+          </p:nvPr>
+        </p:nvSpPr>
+        <p:spPr/>
+        <p:txBody>
+          <a:bodyPr/>
+          <a:lstStyle/>
+          <a:p>
+            <a:r>
+              <a:rPr lang="en-US" dirty="0"/>
+              <a:t>Language Changes</a:t>
+            </a:r>
+          </a:p>
+        </p:txBody>
+      </p:sp>
+      <p:sp>
+        <p:nvSpPr>
+          <p:cNvPr id="3" name="Content Placeholder 2">
+            <a:extLst>
+              <a:ext uri="{FF2B5EF4-FFF2-40B4-BE49-F238E27FC236}">
+                <a16:creationId xmlns:a16="http://schemas.microsoft.com/office/drawing/2014/main" id="{20ABE521-BF95-4441-82E2-23994761C137}"/>
+              </a:ext>
+            </a:extLst>
+          </p:cNvPr>
+          <p:cNvSpPr>
+            <a:spLocks noGrp="1"/>
+          </p:cNvSpPr>
+          <p:nvPr>
+            <p:ph sz="half" idx="1"/>
+          </p:nvPr>
+        </p:nvSpPr>
+        <p:spPr>
+          <a:xfrm>
+            <a:off x="685802" y="2142067"/>
+            <a:ext cx="3016403" cy="3649134"/>
+          </a:xfrm>
+        </p:spPr>
+        <p:txBody>
+          <a:bodyPr>
+            <a:noAutofit/>
+          </a:bodyPr>
+          <a:lstStyle/>
+          <a:p>
+            <a:pPr marL="0" indent="0">
+              <a:buNone/>
+            </a:pPr>
+            <a:r>
+              <a:rPr lang="en-US" sz="2800" dirty="0"/>
+              <a:t>Java Platform Module System</a:t>
+            </a:r>
+          </a:p>
+          <a:p>
+            <a:pPr marL="0" indent="0">
+              <a:buNone/>
+            </a:pPr>
+            <a:r>
+              <a:rPr lang="en-US" sz="2800" dirty="0"/>
+              <a:t>(JPMS)</a:t>
+            </a:r>
+          </a:p>
+        </p:txBody>
+      </p:sp>
+      <p:sp>
+        <p:nvSpPr>
+          <p:cNvPr id="4" name="Content Placeholder 3">
+            <a:extLst>
+              <a:ext uri="{FF2B5EF4-FFF2-40B4-BE49-F238E27FC236}">
+                <a16:creationId xmlns:a16="http://schemas.microsoft.com/office/drawing/2014/main" id="{26204FAF-26E7-1B46-B974-24DDC791B844}"/>
+              </a:ext>
+            </a:extLst>
+          </p:cNvPr>
+          <p:cNvSpPr>
+            <a:spLocks noGrp="1"/>
+          </p:cNvSpPr>
+          <p:nvPr>
+            <p:ph sz="half" idx="2"/>
+          </p:nvPr>
+        </p:nvSpPr>
+        <p:spPr>
+          <a:xfrm>
+            <a:off x="3914078" y="2142067"/>
+            <a:ext cx="6903149" cy="3649133"/>
+          </a:xfrm>
+        </p:spPr>
+        <p:txBody>
+          <a:bodyPr anchor="t">
+            <a:normAutofit fontScale="92500" lnSpcReduction="10000"/>
+          </a:bodyPr>
+          <a:lstStyle/>
+          <a:p>
+            <a:pPr marL="0" indent="0">
+              <a:lnSpc>
+                <a:spcPct val="120000"/>
+              </a:lnSpc>
+              <a:buNone/>
+            </a:pPr>
+            <a:r>
+              <a:rPr lang="en-US" sz="2400" dirty="0"/>
+              <a:t>Additional loading &amp; scoping capabilities</a:t>
+            </a:r>
+          </a:p>
+          <a:p>
+            <a:pPr marL="0" indent="0">
+              <a:buNone/>
+            </a:pPr>
+            <a:endParaRPr lang="en-US" sz="2400" dirty="0"/>
+          </a:p>
+          <a:p>
+            <a:pPr marL="0" indent="0">
+              <a:lnSpc>
+                <a:spcPct val="150000"/>
+              </a:lnSpc>
+              <a:buNone/>
+            </a:pPr>
+            <a:r>
+              <a:rPr lang="en-US" sz="2000" dirty="0"/>
+              <a:t>Encapsulation at the JAR level</a:t>
+            </a:r>
+            <a:endParaRPr lang="en-US" sz="2000" dirty="0">
+              <a:latin typeface="Andale Mono" panose="020B0509000000000004" pitchFamily="49" charset="0"/>
+            </a:endParaRPr>
+          </a:p>
+          <a:p>
+            <a:pPr marL="0" indent="0">
+              <a:lnSpc>
+                <a:spcPct val="150000"/>
+              </a:lnSpc>
+              <a:buNone/>
+            </a:pPr>
+            <a:r>
+              <a:rPr lang="en-US" sz="2000" dirty="0"/>
+              <a:t>New manifest file to declare</a:t>
+            </a:r>
+          </a:p>
+          <a:p>
+            <a:pPr>
+              <a:lnSpc>
+                <a:spcPct val="150000"/>
+              </a:lnSpc>
+            </a:pPr>
+            <a:r>
+              <a:rPr lang="en-US" sz="2000" dirty="0"/>
+              <a:t>Exported packages</a:t>
+            </a:r>
+          </a:p>
+          <a:p>
+            <a:pPr>
+              <a:lnSpc>
+                <a:spcPct val="150000"/>
+              </a:lnSpc>
+            </a:pPr>
+            <a:r>
+              <a:rPr lang="en-US" sz="2000" dirty="0"/>
+              <a:t>Service implementations</a:t>
+            </a:r>
+          </a:p>
+          <a:p>
+            <a:pPr>
+              <a:lnSpc>
+                <a:spcPct val="150000"/>
+              </a:lnSpc>
+            </a:pPr>
+            <a:r>
+              <a:rPr lang="en-US" sz="2000" dirty="0"/>
+              <a:t>External modules</a:t>
+            </a:r>
+          </a:p>
+        </p:txBody>
+      </p:sp>
+    </p:spTree>
+    <p:extLst>
+      <p:ext uri="{BB962C8B-B14F-4D97-AF65-F5344CB8AC3E}">
+        <p14:creationId xmlns:p14="http://schemas.microsoft.com/office/powerpoint/2010/main" val="4232567782"/>
+      </p:ext>
+    </p:extLst>
+  </p:cSld>
+  <p:clrMapOvr>
+    <a:masterClrMapping/>
+  </p:clrMapOvr>
+  <p:timing>
+    <p:tnLst>
+      <p:par>
+        <p:cTn id="1" dur="indefinite" restart="never" nodeType="tmRoot">
+          <p:childTnLst>
+            <p:seq concurrent="1" nextAc="seek">
+              <p:cTn id="2" dur="indefinite" nodeType="mainSeq">
+                <p:childTnLst>
+                  <p:par>
+                    <p:cTn id="3" fill="hold">
+                      <p:stCondLst>
+                        <p:cond delay="indefinite"/>
+                        <p:cond evt="onBegin" delay="0">
+                          <p:tn val="2"/>
+                        </p:cond>
+                      </p:stCondLst>
+                      <p:childTnLst>
+                        <p:par>
+                          <p:cTn id="4" fill="hold">
+                            <p:stCondLst>
+                              <p:cond delay="0"/>
+                            </p:stCondLst>
+                            <p:childTnLst>
+                              <p:par>
+                                <p:cTn id="5" presetID="1" presetClass="entr" presetSubtype="0" fill="hold" nodeType="afterEffect">
+                                  <p:stCondLst>
+                                    <p:cond delay="0"/>
+                                  </p:stCondLst>
+                                  <p:childTnLst>
+                                    <p:set>
+                                      <p:cBhvr>
+                                        <p:cTn id="6" dur="1" fill="hold">
+                                          <p:stCondLst>
+                                            <p:cond delay="0"/>
+                                          </p:stCondLst>
+                                        </p:cTn>
+                                        <p:tgtEl>
+                                          <p:spTgt spid="4">
+                                            <p:txEl>
+                                              <p:pRg st="0" end="0"/>
+                                            </p:txEl>
+                                          </p:spTgt>
+                                        </p:tgtEl>
+                                        <p:attrNameLst>
+                                          <p:attrName>style.visibility</p:attrName>
+                                        </p:attrNameLst>
+                                      </p:cBhvr>
+                                      <p:to>
+                                        <p:strVal val="visible"/>
+                                      </p:to>
+                                    </p:set>
+                                  </p:childTnLst>
+                                </p:cTn>
+                              </p:par>
+                            </p:childTnLst>
+                          </p:cTn>
+                        </p:par>
+                        <p:par>
+                          <p:cTn id="7" fill="hold">
+                            <p:stCondLst>
+                              <p:cond delay="0"/>
+                            </p:stCondLst>
+                            <p:childTnLst>
+                              <p:par>
+                                <p:cTn id="8" presetID="1" presetClass="entr" presetSubtype="0" fill="hold" nodeType="afterEffect">
+                                  <p:stCondLst>
+                                    <p:cond delay="0"/>
+                                  </p:stCondLst>
+                                  <p:childTnLst>
+                                    <p:set>
+                                      <p:cBhvr>
+                                        <p:cTn id="9" dur="1" fill="hold">
+                                          <p:stCondLst>
+                                            <p:cond delay="0"/>
+                                          </p:stCondLst>
+                                        </p:cTn>
+                                        <p:tgtEl>
+                                          <p:spTgt spid="4">
+                                            <p:txEl>
+                                              <p:pRg st="2" end="2"/>
+                                            </p:txEl>
+                                          </p:spTgt>
+                                        </p:tgtEl>
+                                        <p:attrNameLst>
+                                          <p:attrName>style.visibility</p:attrName>
+                                        </p:attrNameLst>
+                                      </p:cBhvr>
+                                      <p:to>
+                                        <p:strVal val="visible"/>
+                                      </p:to>
+                                    </p:set>
+                                  </p:childTnLst>
+                                </p:cTn>
+                              </p:par>
+                              <p:par>
+                                <p:cTn id="10" presetID="1" presetClass="entr" presetSubtype="0" fill="hold" nodeType="withEffect">
+                                  <p:stCondLst>
+                                    <p:cond delay="0"/>
+                                  </p:stCondLst>
+                                  <p:childTnLst>
+                                    <p:set>
+                                      <p:cBhvr>
+                                        <p:cTn id="11" dur="1" fill="hold">
+                                          <p:stCondLst>
+                                            <p:cond delay="0"/>
+                                          </p:stCondLst>
+                                        </p:cTn>
+                                        <p:tgtEl>
+                                          <p:spTgt spid="4">
+                                            <p:txEl>
+                                              <p:pRg st="3" end="3"/>
+                                            </p:txEl>
+                                          </p:spTgt>
+                                        </p:tgtEl>
+                                        <p:attrNameLst>
+                                          <p:attrName>style.visibility</p:attrName>
+                                        </p:attrNameLst>
+                                      </p:cBhvr>
+                                      <p:to>
+                                        <p:strVal val="visible"/>
+                                      </p:to>
+                                    </p:set>
+                                  </p:childTnLst>
+                                </p:cTn>
+                              </p:par>
+                              <p:par>
+                                <p:cTn id="12" presetID="1" presetClass="entr" presetSubtype="0" fill="hold" nodeType="withEffect">
+                                  <p:stCondLst>
+                                    <p:cond delay="0"/>
+                                  </p:stCondLst>
+                                  <p:childTnLst>
+                                    <p:set>
+                                      <p:cBhvr>
+                                        <p:cTn id="13" dur="1" fill="hold">
+                                          <p:stCondLst>
+                                            <p:cond delay="0"/>
+                                          </p:stCondLst>
+                                        </p:cTn>
+                                        <p:tgtEl>
+                                          <p:spTgt spid="4">
+                                            <p:txEl>
+                                              <p:pRg st="4" end="4"/>
+                                            </p:txEl>
+                                          </p:spTgt>
+                                        </p:tgtEl>
+                                        <p:attrNameLst>
+                                          <p:attrName>style.visibility</p:attrName>
+                                        </p:attrNameLst>
+                                      </p:cBhvr>
+                                      <p:to>
+                                        <p:strVal val="visible"/>
+                                      </p:to>
+                                    </p:set>
+                                  </p:childTnLst>
+                                </p:cTn>
+                              </p:par>
+                              <p:par>
+                                <p:cTn id="14" presetID="1" presetClass="entr" presetSubtype="0" fill="hold" nodeType="withEffect">
+                                  <p:stCondLst>
+                                    <p:cond delay="0"/>
+                                  </p:stCondLst>
+                                  <p:childTnLst>
+                                    <p:set>
+                                      <p:cBhvr>
+                                        <p:cTn id="15" dur="1" fill="hold">
+                                          <p:stCondLst>
+                                            <p:cond delay="0"/>
+                                          </p:stCondLst>
+                                        </p:cTn>
+                                        <p:tgtEl>
+                                          <p:spTgt spid="4">
+                                            <p:txEl>
+                                              <p:pRg st="5" end="5"/>
+                                            </p:txEl>
+                                          </p:spTgt>
+                                        </p:tgtEl>
+                                        <p:attrNameLst>
+                                          <p:attrName>style.visibility</p:attrName>
+                                        </p:attrNameLst>
+                                      </p:cBhvr>
+                                      <p:to>
+                                        <p:strVal val="visible"/>
+                                      </p:to>
+                                    </p:set>
+                                  </p:childTnLst>
+                                </p:cTn>
+                              </p:par>
+                              <p:par>
+                                <p:cTn id="16" presetID="1" presetClass="entr" presetSubtype="0" fill="hold" nodeType="withEffect">
+                                  <p:stCondLst>
+                                    <p:cond delay="0"/>
+                                  </p:stCondLst>
+                                  <p:childTnLst>
+                                    <p:set>
+                                      <p:cBhvr>
+                                        <p:cTn id="17" dur="1" fill="hold">
+                                          <p:stCondLst>
+                                            <p:cond delay="0"/>
+                                          </p:stCondLst>
+                                        </p:cTn>
+                                        <p:tgtEl>
+                                          <p:spTgt spid="4">
+                                            <p:txEl>
+                                              <p:pRg st="6" end="6"/>
+                                            </p:txEl>
+                                          </p:spTgt>
+                                        </p:tgtEl>
+                                        <p:attrNameLst>
+                                          <p:attrName>style.visibility</p:attrName>
+                                        </p:attrNameLst>
+                                      </p:cBhvr>
+                                      <p:to>
+                                        <p:strVal val="visible"/>
+                                      </p:to>
+                                    </p:set>
+                                  </p:childTnLst>
+                                </p:cTn>
+                              </p:par>
+                            </p:childTnLst>
+                          </p:cTn>
+                        </p:par>
+                      </p:childTnLst>
+                    </p:cTn>
+                  </p:par>
+                </p:childTnLst>
+              </p:cTn>
+              <p:prevCondLst>
+                <p:cond evt="onPrev" delay="0">
+                  <p:tgtEl>
+                    <p:sldTgt/>
+                  </p:tgtEl>
+                </p:cond>
+              </p:prevCondLst>
+              <p:nextCondLst>
+                <p:cond evt="onNext" delay="0">
+                  <p:tgtEl>
+                    <p:sldTgt/>
+                  </p:tgtEl>
+                </p:cond>
+              </p:nextCondLst>
+            </p:seq>
+          </p:childTnLst>
+        </p:cTn>
+      </p:par>
+    </p:tnLst>
+  </p:timing>
+</p:sld>
+</file>
+
+<file path=ppt/slides/slide7.xml><?xml version="1.0" encoding="utf-8"?>
+<p:sld xmlns:a="http://schemas.openxmlformats.org/drawingml/2006/main" xmlns:r="http://schemas.openxmlformats.org/officeDocument/2006/relationships" xmlns:p="http://schemas.openxmlformats.org/presentationml/2006/main">
+  <p:cSld>
+    <p:spTree>
+      <p:nvGrpSpPr>
+        <p:cNvPr id="1" name=""/>
+        <p:cNvGrpSpPr/>
+        <p:nvPr/>
+      </p:nvGrpSpPr>
+      <p:grpSpPr>
+        <a:xfrm>
+          <a:off x="0" y="0"/>
+          <a:ext cx="0" cy="0"/>
+          <a:chOff x="0" y="0"/>
+          <a:chExt cx="0" cy="0"/>
+        </a:xfrm>
+      </p:grpSpPr>
+      <p:sp>
+        <p:nvSpPr>
+          <p:cNvPr id="2" name="Title 1">
+            <a:extLst>
+              <a:ext uri="{FF2B5EF4-FFF2-40B4-BE49-F238E27FC236}">
+                <a16:creationId xmlns:a16="http://schemas.microsoft.com/office/drawing/2014/main" id="{C2052CE5-F69A-D645-8ECD-5C44E4A30D5C}"/>
+              </a:ext>
+            </a:extLst>
+          </p:cNvPr>
+          <p:cNvSpPr>
+            <a:spLocks noGrp="1"/>
+          </p:cNvSpPr>
+          <p:nvPr>
+            <p:ph type="title"/>
+          </p:nvPr>
+        </p:nvSpPr>
+        <p:spPr/>
+        <p:txBody>
+          <a:bodyPr/>
+          <a:lstStyle/>
+          <a:p>
+            <a:r>
+              <a:rPr lang="en-US" dirty="0"/>
+              <a:t>Language Changes</a:t>
+            </a:r>
+          </a:p>
+        </p:txBody>
+      </p:sp>
+      <p:sp>
+        <p:nvSpPr>
+          <p:cNvPr id="3" name="Content Placeholder 2">
+            <a:extLst>
+              <a:ext uri="{FF2B5EF4-FFF2-40B4-BE49-F238E27FC236}">
+                <a16:creationId xmlns:a16="http://schemas.microsoft.com/office/drawing/2014/main" id="{20ABE521-BF95-4441-82E2-23994761C137}"/>
+              </a:ext>
+            </a:extLst>
+          </p:cNvPr>
+          <p:cNvSpPr>
+            <a:spLocks noGrp="1"/>
+          </p:cNvSpPr>
+          <p:nvPr>
+            <p:ph sz="half" idx="1"/>
+          </p:nvPr>
+        </p:nvSpPr>
+        <p:spPr>
+          <a:xfrm>
+            <a:off x="685802" y="2142067"/>
+            <a:ext cx="3016403" cy="3649134"/>
+          </a:xfrm>
+        </p:spPr>
+        <p:txBody>
+          <a:bodyPr>
+            <a:noAutofit/>
+          </a:bodyPr>
+          <a:lstStyle/>
+          <a:p>
+            <a:pPr marL="0" indent="0">
+              <a:buNone/>
+            </a:pPr>
+            <a:r>
+              <a:rPr lang="en-US" sz="2800" dirty="0"/>
+              <a:t>Java Platform Module System</a:t>
+            </a:r>
+          </a:p>
+          <a:p>
+            <a:pPr marL="0" indent="0">
+              <a:buNone/>
+            </a:pPr>
+            <a:r>
+              <a:rPr lang="en-US" sz="2800" dirty="0"/>
+              <a:t>(JPMS)</a:t>
+            </a:r>
+          </a:p>
+        </p:txBody>
+      </p:sp>
+      <p:sp>
+        <p:nvSpPr>
+          <p:cNvPr id="4" name="Content Placeholder 3">
+            <a:extLst>
+              <a:ext uri="{FF2B5EF4-FFF2-40B4-BE49-F238E27FC236}">
+                <a16:creationId xmlns:a16="http://schemas.microsoft.com/office/drawing/2014/main" id="{26204FAF-26E7-1B46-B974-24DDC791B844}"/>
+              </a:ext>
+            </a:extLst>
+          </p:cNvPr>
+          <p:cNvSpPr>
+            <a:spLocks noGrp="1"/>
+          </p:cNvSpPr>
+          <p:nvPr>
+            <p:ph sz="half" idx="2"/>
+          </p:nvPr>
+        </p:nvSpPr>
+        <p:spPr>
+          <a:xfrm>
+            <a:off x="3914078" y="2142067"/>
+            <a:ext cx="6903149" cy="3649133"/>
+          </a:xfrm>
+        </p:spPr>
+        <p:txBody>
+          <a:bodyPr anchor="t">
+            <a:normAutofit/>
+          </a:bodyPr>
+          <a:lstStyle/>
+          <a:p>
+            <a:pPr marL="0" indent="0">
+              <a:lnSpc>
+                <a:spcPct val="120000"/>
+              </a:lnSpc>
+              <a:buNone/>
+            </a:pPr>
+            <a:r>
+              <a:rPr lang="en-US" sz="2400" dirty="0"/>
+              <a:t>Multi-release JAR files</a:t>
+            </a:r>
+          </a:p>
+          <a:p>
+            <a:pPr marL="0" indent="0">
+              <a:buNone/>
+            </a:pPr>
+            <a:endParaRPr lang="en-US" sz="2400" dirty="0"/>
+          </a:p>
+          <a:p>
+            <a:pPr marL="0" indent="0">
+              <a:lnSpc>
+                <a:spcPct val="150000"/>
+              </a:lnSpc>
+              <a:buNone/>
+            </a:pPr>
+            <a:r>
+              <a:rPr lang="en-US" sz="2000" dirty="0"/>
+              <a:t>JAR files can contain classes specific to a Java release</a:t>
+            </a:r>
+          </a:p>
+          <a:p>
+            <a:pPr marL="0" indent="0">
+              <a:lnSpc>
+                <a:spcPct val="150000"/>
+              </a:lnSpc>
+              <a:buNone/>
+            </a:pPr>
+            <a:r>
+              <a:rPr lang="en-US" sz="2000" dirty="0"/>
+              <a:t>The module loader will ensure these get loaded before the more general classes</a:t>
+            </a:r>
+          </a:p>
+        </p:txBody>
+      </p:sp>
+    </p:spTree>
+    <p:extLst>
+      <p:ext uri="{BB962C8B-B14F-4D97-AF65-F5344CB8AC3E}">
+        <p14:creationId xmlns:p14="http://schemas.microsoft.com/office/powerpoint/2010/main" val="4189443728"/>
+      </p:ext>
+    </p:extLst>
+  </p:cSld>
+  <p:clrMapOvr>
+    <a:masterClrMapping/>
+  </p:clrMapOvr>
+  <p:timing>
+    <p:tnLst>
+      <p:par>
+        <p:cTn id="1" dur="indefinite" restart="never" nodeType="tmRoot">
+          <p:childTnLst>
+            <p:seq concurrent="1" nextAc="seek">
+              <p:cTn id="2" dur="indefinite" nodeType="mainSeq">
+                <p:childTnLst>
+                  <p:par>
+                    <p:cTn id="3" fill="hold">
+                      <p:stCondLst>
+                        <p:cond delay="indefinite"/>
+                        <p:cond evt="onBegin" delay="0">
+                          <p:tn val="2"/>
+                        </p:cond>
+                      </p:stCondLst>
+                      <p:childTnLst>
+                        <p:par>
+                          <p:cTn id="4" fill="hold">
+                            <p:stCondLst>
+                              <p:cond delay="0"/>
+                            </p:stCondLst>
+                            <p:childTnLst>
+                              <p:par>
+                                <p:cTn id="5" presetID="1" presetClass="entr" presetSubtype="0" fill="hold" nodeType="afterEffect">
+                                  <p:stCondLst>
+                                    <p:cond delay="0"/>
+                                  </p:stCondLst>
+                                  <p:childTnLst>
+                                    <p:set>
+                                      <p:cBhvr>
+                                        <p:cTn id="6" dur="1" fill="hold">
+                                          <p:stCondLst>
+                                            <p:cond delay="0"/>
+                                          </p:stCondLst>
+                                        </p:cTn>
+                                        <p:tgtEl>
+                                          <p:spTgt spid="4">
+                                            <p:txEl>
+                                              <p:pRg st="0" end="0"/>
+                                            </p:txEl>
+                                          </p:spTgt>
+                                        </p:tgtEl>
+                                        <p:attrNameLst>
+                                          <p:attrName>style.visibility</p:attrName>
+                                        </p:attrNameLst>
+                                      </p:cBhvr>
+                                      <p:to>
+                                        <p:strVal val="visible"/>
+                                      </p:to>
+                                    </p:set>
+                                  </p:childTnLst>
+                                </p:cTn>
+                              </p:par>
+                            </p:childTnLst>
+                          </p:cTn>
+                        </p:par>
+                        <p:par>
+                          <p:cTn id="7" fill="hold">
+                            <p:stCondLst>
+                              <p:cond delay="0"/>
+                            </p:stCondLst>
+                            <p:childTnLst>
+                              <p:par>
+                                <p:cTn id="8" presetID="1" presetClass="entr" presetSubtype="0" fill="hold" nodeType="afterEffect">
+                                  <p:stCondLst>
+                                    <p:cond delay="0"/>
+                                  </p:stCondLst>
+                                  <p:childTnLst>
+                                    <p:set>
+                                      <p:cBhvr>
+                                        <p:cTn id="9" dur="1" fill="hold">
+                                          <p:stCondLst>
+                                            <p:cond delay="0"/>
+                                          </p:stCondLst>
+                                        </p:cTn>
+                                        <p:tgtEl>
+                                          <p:spTgt spid="4">
+                                            <p:txEl>
+                                              <p:pRg st="2" end="2"/>
+                                            </p:txEl>
+                                          </p:spTgt>
+                                        </p:tgtEl>
+                                        <p:attrNameLst>
+                                          <p:attrName>style.visibility</p:attrName>
+                                        </p:attrNameLst>
+                                      </p:cBhvr>
+                                      <p:to>
+                                        <p:strVal val="visible"/>
+                                      </p:to>
+                                    </p:set>
+                                  </p:childTnLst>
+                                </p:cTn>
+                              </p:par>
+                            </p:childTnLst>
+                          </p:cTn>
+                        </p:par>
+                        <p:par>
+                          <p:cTn id="10" fill="hold">
+                            <p:stCondLst>
+                              <p:cond delay="0"/>
+                            </p:stCondLst>
+                            <p:childTnLst>
+                              <p:par>
+                                <p:cTn id="11" presetID="1" presetClass="entr" presetSubtype="0" fill="hold" nodeType="afterEffect">
+                                  <p:stCondLst>
+                                    <p:cond delay="0"/>
+                                  </p:stCondLst>
+                                  <p:childTnLst>
+                                    <p:set>
+                                      <p:cBhvr>
+                                        <p:cTn id="12" dur="1" fill="hold">
+                                          <p:stCondLst>
+                                            <p:cond delay="0"/>
+                                          </p:stCondLst>
+                                        </p:cTn>
+                                        <p:tgtEl>
+                                          <p:spTgt spid="4">
+                                            <p:txEl>
+                                              <p:pRg st="3" end="3"/>
+                                            </p:txEl>
+                                          </p:spTgt>
+                                        </p:tgtEl>
+                                        <p:attrNameLst>
+                                          <p:attrName>style.visibility</p:attrName>
+                                        </p:attrNameLst>
+                                      </p:cBhvr>
+                                      <p:to>
+                                        <p:strVal val="visible"/>
+                                      </p:to>
+                                    </p:set>
+                                  </p:childTnLst>
+                                </p:cTn>
+                              </p:par>
+                            </p:childTnLst>
+                          </p:cTn>
+                        </p:par>
+                      </p:childTnLst>
+                    </p:cTn>
+                  </p:par>
+                </p:childTnLst>
+              </p:cTn>
+              <p:prevCondLst>
+                <p:cond evt="onPrev" delay="0">
+                  <p:tgtEl>
+                    <p:sldTgt/>
+                  </p:tgtEl>
+                </p:cond>
+              </p:prevCondLst>
+              <p:nextCondLst>
+                <p:cond evt="onNext" delay="0">
+                  <p:tgtEl>
+                    <p:sldTgt/>
+                  </p:tgtEl>
+                </p:cond>
+              </p:nextCondLst>
+            </p:seq>
+          </p:childTnLst>
+        </p:cTn>
+      </p:par>
+    </p:tnLst>
+  </p:timing>
+</p:sld>
+</file>
+
+<file path=ppt/slides/slide8.xml><?xml version="1.0" encoding="utf-8"?>
+<p:sld xmlns:a="http://schemas.openxmlformats.org/drawingml/2006/main" xmlns:r="http://schemas.openxmlformats.org/officeDocument/2006/relationships" xmlns:p="http://schemas.openxmlformats.org/presentationml/2006/main">
+  <p:cSld>
+    <p:spTree>
+      <p:nvGrpSpPr>
+        <p:cNvPr id="1" name=""/>
+        <p:cNvGrpSpPr/>
+        <p:nvPr/>
+      </p:nvGrpSpPr>
+      <p:grpSpPr>
+        <a:xfrm>
+          <a:off x="0" y="0"/>
+          <a:ext cx="0" cy="0"/>
+          <a:chOff x="0" y="0"/>
+          <a:chExt cx="0" cy="0"/>
+        </a:xfrm>
+      </p:grpSpPr>
+      <p:sp>
+        <p:nvSpPr>
+          <p:cNvPr id="2" name="Title 1">
+            <a:extLst>
+              <a:ext uri="{FF2B5EF4-FFF2-40B4-BE49-F238E27FC236}">
+                <a16:creationId xmlns:a16="http://schemas.microsoft.com/office/drawing/2014/main" id="{C2052CE5-F69A-D645-8ECD-5C44E4A30D5C}"/>
+              </a:ext>
+            </a:extLst>
+          </p:cNvPr>
+          <p:cNvSpPr>
+            <a:spLocks noGrp="1"/>
+          </p:cNvSpPr>
+          <p:nvPr>
+            <p:ph type="title"/>
+          </p:nvPr>
+        </p:nvSpPr>
+        <p:spPr/>
+        <p:txBody>
+          <a:bodyPr/>
+          <a:lstStyle/>
+          <a:p>
+            <a:r>
+              <a:rPr lang="en-US" dirty="0"/>
+              <a:t>Language Changes</a:t>
+            </a:r>
+          </a:p>
+        </p:txBody>
+      </p:sp>
+      <p:sp>
+        <p:nvSpPr>
+          <p:cNvPr id="3" name="Content Placeholder 2">
+            <a:extLst>
+              <a:ext uri="{FF2B5EF4-FFF2-40B4-BE49-F238E27FC236}">
+                <a16:creationId xmlns:a16="http://schemas.microsoft.com/office/drawing/2014/main" id="{20ABE521-BF95-4441-82E2-23994761C137}"/>
+              </a:ext>
+            </a:extLst>
+          </p:cNvPr>
+          <p:cNvSpPr>
+            <a:spLocks noGrp="1"/>
+          </p:cNvSpPr>
+          <p:nvPr>
+            <p:ph sz="half" idx="1"/>
+          </p:nvPr>
+        </p:nvSpPr>
+        <p:spPr>
+          <a:xfrm>
+            <a:off x="685802" y="2142067"/>
+            <a:ext cx="3016403" cy="3649134"/>
+          </a:xfrm>
+        </p:spPr>
+        <p:txBody>
+          <a:bodyPr>
+            <a:noAutofit/>
+          </a:bodyPr>
+          <a:lstStyle/>
+          <a:p>
+            <a:pPr marL="0" indent="0">
+              <a:buNone/>
+            </a:pPr>
+            <a:r>
+              <a:rPr lang="en-US" sz="2800" dirty="0"/>
+              <a:t>Java Platform Module System</a:t>
+            </a:r>
+          </a:p>
+          <a:p>
+            <a:pPr marL="0" indent="0">
+              <a:buNone/>
+            </a:pPr>
+            <a:r>
+              <a:rPr lang="en-US" sz="2800" dirty="0"/>
+              <a:t>(JPMS)</a:t>
+            </a:r>
+          </a:p>
+        </p:txBody>
+      </p:sp>
+      <p:sp>
+        <p:nvSpPr>
+          <p:cNvPr id="4" name="Content Placeholder 3">
+            <a:extLst>
+              <a:ext uri="{FF2B5EF4-FFF2-40B4-BE49-F238E27FC236}">
+                <a16:creationId xmlns:a16="http://schemas.microsoft.com/office/drawing/2014/main" id="{26204FAF-26E7-1B46-B974-24DDC791B844}"/>
+              </a:ext>
+            </a:extLst>
+          </p:cNvPr>
+          <p:cNvSpPr>
+            <a:spLocks noGrp="1"/>
+          </p:cNvSpPr>
+          <p:nvPr>
+            <p:ph sz="half" idx="2"/>
+          </p:nvPr>
+        </p:nvSpPr>
+        <p:spPr>
+          <a:xfrm>
+            <a:off x="3914078" y="2142067"/>
+            <a:ext cx="6903149" cy="3649133"/>
+          </a:xfrm>
+        </p:spPr>
+        <p:txBody>
+          <a:bodyPr anchor="t">
+            <a:normAutofit/>
+          </a:bodyPr>
+          <a:lstStyle/>
+          <a:p>
+            <a:pPr marL="0" indent="0">
+              <a:lnSpc>
+                <a:spcPct val="120000"/>
+              </a:lnSpc>
+              <a:buNone/>
+            </a:pPr>
+            <a:r>
+              <a:rPr lang="en-US" sz="2400" dirty="0"/>
+              <a:t>Adoption</a:t>
+            </a:r>
+          </a:p>
+          <a:p>
+            <a:pPr marL="0" indent="0">
+              <a:buNone/>
+            </a:pPr>
+            <a:endParaRPr lang="en-US" sz="2400" dirty="0"/>
+          </a:p>
+          <a:p>
+            <a:pPr marL="0" indent="0">
+              <a:lnSpc>
+                <a:spcPct val="150000"/>
+              </a:lnSpc>
+              <a:buNone/>
+            </a:pPr>
+            <a:r>
+              <a:rPr lang="en-US" sz="2000" dirty="0"/>
+              <a:t>JDK itself is the primary user</a:t>
+            </a:r>
+          </a:p>
+          <a:p>
+            <a:pPr>
+              <a:lnSpc>
+                <a:spcPct val="150000"/>
+              </a:lnSpc>
+            </a:pPr>
+            <a:r>
+              <a:rPr lang="en-US" sz="2000" dirty="0"/>
+              <a:t>Fully restructured and repackaged as modules</a:t>
+            </a:r>
+          </a:p>
+          <a:p>
+            <a:pPr marL="0" indent="0">
+              <a:lnSpc>
+                <a:spcPct val="150000"/>
+              </a:lnSpc>
+              <a:buNone/>
+            </a:pPr>
+            <a:r>
+              <a:rPr lang="en-US" sz="2000" dirty="0"/>
+              <a:t>Reception by the general community is lukewarm, adoption slow</a:t>
+            </a:r>
+          </a:p>
+        </p:txBody>
+      </p:sp>
+    </p:spTree>
+    <p:extLst>
+      <p:ext uri="{BB962C8B-B14F-4D97-AF65-F5344CB8AC3E}">
+        <p14:creationId xmlns:p14="http://schemas.microsoft.com/office/powerpoint/2010/main" val="2443585651"/>
+      </p:ext>
+    </p:extLst>
+  </p:cSld>
+  <p:clrMapOvr>
+    <a:masterClrMapping/>
+  </p:clrMapOvr>
+  <p:timing>
+    <p:tnLst>
+      <p:par>
+        <p:cTn id="1" dur="indefinite" restart="never" nodeType="tmRoot">
+          <p:childTnLst>
+            <p:seq concurrent="1" nextAc="seek">
+              <p:cTn id="2" dur="indefinite" nodeType="mainSeq">
+                <p:childTnLst>
+                  <p:par>
+                    <p:cTn id="3" fill="hold">
+                      <p:stCondLst>
+                        <p:cond delay="indefinite"/>
+                        <p:cond evt="onBegin" delay="0">
+                          <p:tn val="2"/>
+                        </p:cond>
+                      </p:stCondLst>
+                      <p:childTnLst>
+                        <p:par>
+                          <p:cTn id="4" fill="hold">
+                            <p:stCondLst>
+                              <p:cond delay="0"/>
+                            </p:stCondLst>
+                            <p:childTnLst>
+                              <p:par>
+                                <p:cTn id="5" presetID="1" presetClass="entr" presetSubtype="0" fill="hold" nodeType="afterEffect">
+                                  <p:stCondLst>
+                                    <p:cond delay="0"/>
+                                  </p:stCondLst>
+                                  <p:childTnLst>
+                                    <p:set>
+                                      <p:cBhvr>
+                                        <p:cTn id="6" dur="1" fill="hold">
+                                          <p:stCondLst>
+                                            <p:cond delay="0"/>
+                                          </p:stCondLst>
+                                        </p:cTn>
+                                        <p:tgtEl>
+                                          <p:spTgt spid="4">
+                                            <p:txEl>
+                                              <p:pRg st="0" end="0"/>
+                                            </p:txEl>
+                                          </p:spTgt>
+                                        </p:tgtEl>
+                                        <p:attrNameLst>
+                                          <p:attrName>style.visibility</p:attrName>
+                                        </p:attrNameLst>
+                                      </p:cBhvr>
+                                      <p:to>
+                                        <p:strVal val="visible"/>
+                                      </p:to>
+                                    </p:set>
+                                  </p:childTnLst>
+                                </p:cTn>
+                              </p:par>
+                            </p:childTnLst>
+                          </p:cTn>
+                        </p:par>
+                        <p:par>
+                          <p:cTn id="7" fill="hold">
+                            <p:stCondLst>
+                              <p:cond delay="0"/>
+                            </p:stCondLst>
+                            <p:childTnLst>
+                              <p:par>
+                                <p:cTn id="8" presetID="1" presetClass="entr" presetSubtype="0" fill="hold" nodeType="afterEffect">
+                                  <p:stCondLst>
+                                    <p:cond delay="0"/>
+                                  </p:stCondLst>
+                                  <p:childTnLst>
+                                    <p:set>
+                                      <p:cBhvr>
+                                        <p:cTn id="9" dur="1" fill="hold">
+                                          <p:stCondLst>
+                                            <p:cond delay="0"/>
+                                          </p:stCondLst>
+                                        </p:cTn>
+                                        <p:tgtEl>
+                                          <p:spTgt spid="4">
+                                            <p:txEl>
+                                              <p:pRg st="2" end="2"/>
+                                            </p:txEl>
+                                          </p:spTgt>
+                                        </p:tgtEl>
+                                        <p:attrNameLst>
+                                          <p:attrName>style.visibility</p:attrName>
+                                        </p:attrNameLst>
+                                      </p:cBhvr>
+                                      <p:to>
+                                        <p:strVal val="visible"/>
+                                      </p:to>
+                                    </p:set>
+                                  </p:childTnLst>
+                                </p:cTn>
+                              </p:par>
+                            </p:childTnLst>
+                          </p:cTn>
+                        </p:par>
+                        <p:par>
+                          <p:cTn id="10" fill="hold">
+                            <p:stCondLst>
+                              <p:cond delay="0"/>
+                            </p:stCondLst>
+                            <p:childTnLst>
+                              <p:par>
+                                <p:cTn id="11" presetID="1" presetClass="entr" presetSubtype="0" fill="hold" nodeType="afterEffect">
+                                  <p:stCondLst>
+                                    <p:cond delay="0"/>
+                                  </p:stCondLst>
+                                  <p:childTnLst>
+                                    <p:set>
+                                      <p:cBhvr>
+                                        <p:cTn id="12" dur="1" fill="hold">
+                                          <p:stCondLst>
+                                            <p:cond delay="0"/>
+                                          </p:stCondLst>
+                                        </p:cTn>
+                                        <p:tgtEl>
+                                          <p:spTgt spid="4">
+                                            <p:txEl>
+                                              <p:pRg st="3" end="3"/>
+                                            </p:txEl>
+                                          </p:spTgt>
+                                        </p:tgtEl>
+                                        <p:attrNameLst>
+                                          <p:attrName>style.visibility</p:attrName>
+                                        </p:attrNameLst>
+                                      </p:cBhvr>
+                                      <p:to>
+                                        <p:strVal val="visible"/>
+                                      </p:to>
+                                    </p:set>
+                                  </p:childTnLst>
+                                </p:cTn>
+                              </p:par>
+                            </p:childTnLst>
+                          </p:cTn>
+                        </p:par>
+                        <p:par>
+                          <p:cTn id="13" fill="hold">
+                            <p:stCondLst>
+                              <p:cond delay="0"/>
+                            </p:stCondLst>
+                            <p:childTnLst>
+                              <p:par>
+                                <p:cTn id="14" presetID="1" presetClass="entr" presetSubtype="0" fill="hold" nodeType="afterEffect">
+                                  <p:stCondLst>
+                                    <p:cond delay="0"/>
+                                  </p:stCondLst>
+                                  <p:childTnLst>
+                                    <p:set>
+                                      <p:cBhvr>
+                                        <p:cTn id="15" dur="1" fill="hold">
+                                          <p:stCondLst>
+                                            <p:cond delay="0"/>
+                                          </p:stCondLst>
+                                        </p:cTn>
+                                        <p:tgtEl>
+                                          <p:spTgt spid="4">
+                                            <p:txEl>
+                                              <p:pRg st="4" end="4"/>
+                                            </p:txEl>
+                                          </p:spTgt>
+                                        </p:tgtEl>
+                                        <p:attrNameLst>
+                                          <p:attrName>style.visibility</p:attrName>
+                                        </p:attrNameLst>
+                                      </p:cBhvr>
+                                      <p:to>
+                                        <p:strVal val="visible"/>
+                                      </p:to>
+                                    </p:set>
+                                  </p:childTnLst>
+                                </p:cTn>
+                              </p:par>
+                            </p:childTnLst>
+                          </p:cTn>
+                        </p:par>
+                      </p:childTnLst>
+                    </p:cTn>
+                  </p:par>
+                </p:childTnLst>
+              </p:cTn>
+              <p:prevCondLst>
+                <p:cond evt="onPrev" delay="0">
+                  <p:tgtEl>
+                    <p:sldTgt/>
+                  </p:tgtEl>
+                </p:cond>
+              </p:prevCondLst>
+              <p:nextCondLst>
+                <p:cond evt="onNext" delay="0">
+                  <p:tgtEl>
+                    <p:sldTgt/>
+                  </p:tgtEl>
+                </p:cond>
+              </p:nextCondLst>
+            </p:seq>
+          </p:childTnLst>
+        </p:cTn>
+      </p:par>
+    </p:tnLst>
+  </p:timing>
+</p:sld>
+</file>
+
+<file path=ppt/slides/slide9.xml><?xml version="1.0" encoding="utf-8"?>
+<p:sld xmlns:a="http://schemas.openxmlformats.org/drawingml/2006/main" xmlns:r="http://schemas.openxmlformats.org/officeDocument/2006/relationships" xmlns:p="http://schemas.openxmlformats.org/presentationml/2006/main">
+  <p:cSld>
+    <p:spTree>
+      <p:nvGrpSpPr>
+        <p:cNvPr id="1" name=""/>
+        <p:cNvGrpSpPr/>
+        <p:nvPr/>
+      </p:nvGrpSpPr>
+      <p:grpSpPr>
+        <a:xfrm>
+          <a:off x="0" y="0"/>
+          <a:ext cx="0" cy="0"/>
+          <a:chOff x="0" y="0"/>
+          <a:chExt cx="0" cy="0"/>
+        </a:xfrm>
+      </p:grpSpPr>
+      <p:sp>
+        <p:nvSpPr>
+          <p:cNvPr id="2" name="Title 1">
+            <a:extLst>
+              <a:ext uri="{FF2B5EF4-FFF2-40B4-BE49-F238E27FC236}">
+                <a16:creationId xmlns:a16="http://schemas.microsoft.com/office/drawing/2014/main" id="{C2052CE5-F69A-D645-8ECD-5C44E4A30D5C}"/>
+              </a:ext>
+            </a:extLst>
+          </p:cNvPr>
+          <p:cNvSpPr>
+            <a:spLocks noGrp="1"/>
+          </p:cNvSpPr>
+          <p:nvPr>
+            <p:ph type="title"/>
+          </p:nvPr>
+        </p:nvSpPr>
+        <p:spPr/>
+        <p:txBody>
+          <a:bodyPr/>
+          <a:lstStyle/>
+          <a:p>
+            <a:r>
+              <a:rPr lang="en-US" dirty="0"/>
+              <a:t>Language Changes</a:t>
+            </a:r>
+          </a:p>
+        </p:txBody>
+      </p:sp>
+      <p:sp>
+        <p:nvSpPr>
+          <p:cNvPr id="3" name="Content Placeholder 2">
+            <a:extLst>
+              <a:ext uri="{FF2B5EF4-FFF2-40B4-BE49-F238E27FC236}">
+                <a16:creationId xmlns:a16="http://schemas.microsoft.com/office/drawing/2014/main" id="{20ABE521-BF95-4441-82E2-23994761C137}"/>
+              </a:ext>
+            </a:extLst>
+          </p:cNvPr>
+          <p:cNvSpPr>
+            <a:spLocks noGrp="1"/>
+          </p:cNvSpPr>
+          <p:nvPr>
+            <p:ph sz="half" idx="1"/>
+          </p:nvPr>
+        </p:nvSpPr>
+        <p:spPr>
+          <a:xfrm>
+            <a:off x="685802" y="2142067"/>
+            <a:ext cx="3016403" cy="3649134"/>
+          </a:xfrm>
+        </p:spPr>
+        <p:txBody>
+          <a:bodyPr>
+            <a:noAutofit/>
+          </a:bodyPr>
+          <a:lstStyle/>
+          <a:p>
+            <a:pPr marL="0" indent="0">
+              <a:buNone/>
+            </a:pPr>
+            <a:r>
+              <a:rPr lang="en-US" sz="2800" dirty="0"/>
+              <a:t>Private Interface Methods</a:t>
+            </a:r>
+          </a:p>
+        </p:txBody>
+      </p:sp>
+      <p:sp>
+        <p:nvSpPr>
+          <p:cNvPr id="4" name="Content Placeholder 3">
+            <a:extLst>
+              <a:ext uri="{FF2B5EF4-FFF2-40B4-BE49-F238E27FC236}">
+                <a16:creationId xmlns:a16="http://schemas.microsoft.com/office/drawing/2014/main" id="{26204FAF-26E7-1B46-B974-24DDC791B844}"/>
+              </a:ext>
+            </a:extLst>
+          </p:cNvPr>
+          <p:cNvSpPr>
+            <a:spLocks noGrp="1"/>
+          </p:cNvSpPr>
+          <p:nvPr>
+            <p:ph sz="half" idx="2"/>
+          </p:nvPr>
+        </p:nvSpPr>
+        <p:spPr>
+          <a:xfrm>
+            <a:off x="3914078" y="2142067"/>
+            <a:ext cx="6903149" cy="3649133"/>
+          </a:xfrm>
+        </p:spPr>
+        <p:txBody>
+          <a:bodyPr anchor="t">
+            <a:normAutofit/>
+          </a:bodyPr>
+          <a:lstStyle/>
+          <a:p>
+            <a:pPr marL="0" indent="0">
+              <a:lnSpc>
+                <a:spcPct val="120000"/>
+              </a:lnSpc>
+              <a:buNone/>
+            </a:pPr>
+            <a:r>
+              <a:rPr lang="en-US" sz="2400" dirty="0"/>
+              <a:t>Private non-virtual methods on interfaces</a:t>
+            </a:r>
+          </a:p>
+          <a:p>
+            <a:pPr marL="0" indent="0">
+              <a:buNone/>
+            </a:pPr>
+            <a:endParaRPr lang="en-US" sz="2400" dirty="0"/>
+          </a:p>
+          <a:p>
+            <a:pPr marL="0" indent="0">
+              <a:lnSpc>
+                <a:spcPct val="150000"/>
+              </a:lnSpc>
+              <a:buNone/>
+            </a:pPr>
+            <a:r>
+              <a:rPr lang="en-US" sz="2000" dirty="0"/>
+              <a:t>Interfaces with behavior?! Preposterous!</a:t>
+            </a:r>
+          </a:p>
+          <a:p>
+            <a:pPr marL="0" indent="0">
+              <a:lnSpc>
+                <a:spcPct val="150000"/>
+              </a:lnSpc>
+              <a:buNone/>
+            </a:pPr>
+            <a:r>
+              <a:rPr lang="en-US" sz="2000" dirty="0"/>
+              <a:t>Only private methods, so of limited use</a:t>
+            </a:r>
+          </a:p>
+          <a:p>
+            <a:pPr marL="0" indent="0">
+              <a:lnSpc>
+                <a:spcPct val="150000"/>
+              </a:lnSpc>
+              <a:buNone/>
+            </a:pPr>
+            <a:r>
+              <a:rPr lang="en-US" sz="2000" dirty="0"/>
+              <a:t>Think of them as helpers for </a:t>
+            </a:r>
+            <a:r>
+              <a:rPr lang="en-US" sz="2000"/>
+              <a:t>default methods, a factoring tool</a:t>
+            </a:r>
+            <a:endParaRPr lang="en-US" sz="2000" dirty="0"/>
+          </a:p>
+        </p:txBody>
+      </p:sp>
+    </p:spTree>
+    <p:extLst>
+      <p:ext uri="{BB962C8B-B14F-4D97-AF65-F5344CB8AC3E}">
+        <p14:creationId xmlns:p14="http://schemas.microsoft.com/office/powerpoint/2010/main" val="943218570"/>
+      </p:ext>
+    </p:extLst>
+  </p:cSld>
+  <p:clrMapOvr>
+    <a:masterClrMapping/>
+  </p:clrMapOvr>
+  <p:timing>
+    <p:tnLst>
+      <p:par>
+        <p:cTn id="1" dur="indefinite" restart="never" nodeType="tmRoot">
+          <p:childTnLst>
+            <p:seq concurrent="1" nextAc="seek">
+              <p:cTn id="2" dur="indefinite" nodeType="mainSeq">
+                <p:childTnLst>
+                  <p:par>
+                    <p:cTn id="3" fill="hold">
+                      <p:stCondLst>
+                        <p:cond delay="indefinite"/>
+                        <p:cond evt="onBegin" delay="0">
+                          <p:tn val="2"/>
+                        </p:cond>
+                      </p:stCondLst>
+                      <p:childTnLst>
+                        <p:par>
+                          <p:cTn id="4" fill="hold">
+                            <p:stCondLst>
+                              <p:cond delay="0"/>
+                            </p:stCondLst>
+                            <p:childTnLst>
+                              <p:par>
+                                <p:cTn id="5" presetID="1" presetClass="entr" presetSubtype="0" fill="hold" nodeType="afterEffect">
+                                  <p:stCondLst>
+                                    <p:cond delay="0"/>
+                                  </p:stCondLst>
+                                  <p:childTnLst>
+                                    <p:set>
+                                      <p:cBhvr>
+                                        <p:cTn id="6" dur="1" fill="hold">
+                                          <p:stCondLst>
+                                            <p:cond delay="0"/>
+                                          </p:stCondLst>
+                                        </p:cTn>
+                                        <p:tgtEl>
+                                          <p:spTgt spid="4">
+                                            <p:txEl>
+                                              <p:pRg st="0" end="0"/>
+                                            </p:txEl>
+                                          </p:spTgt>
+                                        </p:tgtEl>
+                                        <p:attrNameLst>
+                                          <p:attrName>style.visibility</p:attrName>
+                                        </p:attrNameLst>
+                                      </p:cBhvr>
+                                      <p:to>
+                                        <p:strVal val="visible"/>
+                                      </p:to>
+                                    </p:set>
+                                  </p:childTnLst>
+                                </p:cTn>
+                              </p:par>
+                            </p:childTnLst>
+                          </p:cTn>
+                        </p:par>
+                        <p:par>
+                          <p:cTn id="7" fill="hold">
+                            <p:stCondLst>
+                              <p:cond delay="0"/>
+                            </p:stCondLst>
+                            <p:childTnLst>
+                              <p:par>
+                                <p:cTn id="8" presetID="1" presetClass="entr" presetSubtype="0" fill="hold" nodeType="afterEffect">
+                                  <p:stCondLst>
+                                    <p:cond delay="0"/>
+                                  </p:stCondLst>
+                                  <p:childTnLst>
+                                    <p:set>
+                                      <p:cBhvr>
+                                        <p:cTn id="9" dur="1" fill="hold">
+                                          <p:stCondLst>
+                                            <p:cond delay="0"/>
+                                          </p:stCondLst>
+                                        </p:cTn>
+                                        <p:tgtEl>
+                                          <p:spTgt spid="4">
+                                            <p:txEl>
+                                              <p:pRg st="2" end="2"/>
+                                            </p:txEl>
+                                          </p:spTgt>
+                                        </p:tgtEl>
+                                        <p:attrNameLst>
+                                          <p:attrName>style.visibility</p:attrName>
+                                        </p:attrNameLst>
+                                      </p:cBhvr>
+                                      <p:to>
+                                        <p:strVal val="visible"/>
+                                      </p:to>
+                                    </p:set>
+                                  </p:childTnLst>
+                                </p:cTn>
+                              </p:par>
+                            </p:childTnLst>
+                          </p:cTn>
+                        </p:par>
+                        <p:par>
+                          <p:cTn id="10" fill="hold">
+                            <p:stCondLst>
+                              <p:cond delay="0"/>
+                            </p:stCondLst>
+                            <p:childTnLst>
+                              <p:par>
+                                <p:cTn id="11" presetID="1" presetClass="entr" presetSubtype="0" fill="hold" nodeType="afterEffect">
+                                  <p:stCondLst>
+                                    <p:cond delay="0"/>
+                                  </p:stCondLst>
+                                  <p:childTnLst>
+                                    <p:set>
+                                      <p:cBhvr>
+                                        <p:cTn id="12" dur="1" fill="hold">
+                                          <p:stCondLst>
+                                            <p:cond delay="0"/>
+                                          </p:stCondLst>
+                                        </p:cTn>
+                                        <p:tgtEl>
+                                          <p:spTgt spid="4">
+                                            <p:txEl>
+                                              <p:pRg st="3" end="3"/>
+                                            </p:txEl>
+                                          </p:spTgt>
+                                        </p:tgtEl>
+                                        <p:attrNameLst>
+                                          <p:attrName>style.visibility</p:attrName>
+                                        </p:attrNameLst>
+                                      </p:cBhvr>
+                                      <p:to>
+                                        <p:strVal val="visible"/>
+                                      </p:to>
+                                    </p:set>
+                                  </p:childTnLst>
+                                </p:cTn>
+                              </p:par>
+                            </p:childTnLst>
+                          </p:cTn>
+                        </p:par>
+                        <p:par>
+                          <p:cTn id="13" fill="hold">
+                            <p:stCondLst>
+                              <p:cond delay="0"/>
+                            </p:stCondLst>
+                            <p:childTnLst>
+                              <p:par>
+                                <p:cTn id="14" presetID="1" presetClass="entr" presetSubtype="0" fill="hold" nodeType="afterEffect">
+                                  <p:stCondLst>
+                                    <p:cond delay="0"/>
+                                  </p:stCondLst>
+                                  <p:childTnLst>
+                                    <p:set>
+                                      <p:cBhvr>
+                                        <p:cTn id="15" dur="1" fill="hold">
+                                          <p:stCondLst>
+                                            <p:cond delay="0"/>
+                                          </p:stCondLst>
+                                        </p:cTn>
+                                        <p:tgtEl>
+                                          <p:spTgt spid="4">
+                                            <p:txEl>
+                                              <p:pRg st="4" end="4"/>
+                                            </p:txEl>
+                                          </p:spTgt>
+                                        </p:tgtEl>
+                                        <p:attrNameLst>
+                                          <p:attrName>style.visibility</p:attrName>
+                                        </p:attrNameLst>
+                                      </p:cBhvr>
+                                      <p:to>
+                                        <p:strVal val="visible"/>
+                                      </p:to>
+                                    </p:set>
+                                  </p:childTnLst>
+                                </p:cTn>
+                              </p:par>
+                            </p:childTnLst>
+                          </p:cTn>
+                        </p:par>
+                      </p:childTnLst>
+                    </p:cTn>
+                  </p:par>
+                </p:childTnLst>
+              </p:cTn>
+              <p:prevCondLst>
+                <p:cond evt="onPrev" delay="0">
+                  <p:tgtEl>
+                    <p:sldTgt/>
+                  </p:tgtEl>
+                </p:cond>
+              </p:prevCondLst>
+              <p:nextCondLst>
+                <p:cond evt="onNext" delay="0">
+                  <p:tgtEl>
+                    <p:sldTgt/>
+                  </p:tgtEl>
+                </p:cond>
+              </p:nextCondLst>
+            </p:seq>
+          </p:childTnLst>
+        </p:cTn>
+      </p:par>
+    </p:tnLst>
+  </p:timing>
 </p:sld>
 </file>
 
@@ -6090,4 +10260,299 @@
     </a:ext>
   </a:extLst>
 </a:theme>
+</file>
+
+<file path=ppt/theme/theme2.xml><?xml version="1.0" encoding="utf-8"?>
+<a:theme xmlns:a="http://schemas.openxmlformats.org/drawingml/2006/main" name="Office Theme">
+  <a:themeElements>
+    <a:clrScheme name="Office">
+      <a:dk1>
+        <a:sysClr val="windowText" lastClr="000000"/>
+      </a:dk1>
+      <a:lt1>
+        <a:sysClr val="window" lastClr="FFFFFF"/>
+      </a:lt1>
+      <a:dk2>
+        <a:srgbClr val="44546A"/>
+      </a:dk2>
+      <a:lt2>
+        <a:srgbClr val="E7E6E6"/>
+      </a:lt2>
+      <a:accent1>
+        <a:srgbClr val="4472C4"/>
+      </a:accent1>
+      <a:accent2>
+        <a:srgbClr val="ED7D31"/>
+      </a:accent2>
+      <a:accent3>
+        <a:srgbClr val="A5A5A5"/>
+      </a:accent3>
+      <a:accent4>
+        <a:srgbClr val="FFC000"/>
+      </a:accent4>
+      <a:accent5>
+        <a:srgbClr val="5B9BD5"/>
+      </a:accent5>
+      <a:accent6>
+        <a:srgbClr val="70AD47"/>
+      </a:accent6>
+      <a:hlink>
+        <a:srgbClr val="0563C1"/>
+      </a:hlink>
+      <a:folHlink>
+        <a:srgbClr val="954F72"/>
+      </a:folHlink>
+    </a:clrScheme>
+    <a:fontScheme name="Office">
+      <a:majorFont>
+        <a:latin typeface="Calibri Light" panose="020F0302020204030204"/>
+        <a:ea typeface=""/>
+        <a:cs typeface=""/>
+        <a:font script="Jpan" typeface="游ゴシック Light"/>
+        <a:font script="Hang" typeface="맑은 고딕"/>
+        <a:font script="Hans" typeface="等线 Light"/>
+        <a:font script="Hant" typeface="新細明體"/>
+        <a:font script="Arab" typeface="Times New Roman"/>
+        <a:font script="Hebr" typeface="Times New Roman"/>
+        <a:font script="Thai" typeface="Angsana New"/>
+        <a:font script="Ethi" typeface="Nyala"/>
+        <a:font script="Beng" typeface="Vrinda"/>
+        <a:font script="Gujr" typeface="Shruti"/>
+        <a:font script="Khmr" typeface="MoolBoran"/>
+        <a:font script="Knda" typeface="Tunga"/>
+        <a:font script="Guru" typeface="Raavi"/>
+        <a:font script="Cans" typeface="Euphemia"/>
+        <a:font script="Cher" typeface="Plantagenet Cherokee"/>
+        <a:font script="Yiii" typeface="Microsoft Yi Baiti"/>
+        <a:font script="Tibt" typeface="Microsoft Himalaya"/>
+        <a:font script="Thaa" typeface="MV Boli"/>
+        <a:font script="Deva" typeface="Mangal"/>
+        <a:font script="Telu" typeface="Gautami"/>
+        <a:font script="Taml" typeface="Latha"/>
+        <a:font script="Syrc" typeface="Estrangelo Edessa"/>
+        <a:font script="Orya" typeface="Kalinga"/>
+        <a:font script="Mlym" typeface="Kartika"/>
+        <a:font script="Laoo" typeface="DokChampa"/>
+        <a:font script="Sinh" typeface="Iskoola Pota"/>
+        <a:font script="Mong" typeface="Mongolian Baiti"/>
+        <a:font script="Viet" typeface="Times New Roman"/>
+        <a:font script="Uigh" typeface="Microsoft Uighur"/>
+        <a:font script="Geor" typeface="Sylfaen"/>
+        <a:font script="Armn" typeface="Arial"/>
+        <a:font script="Bugi" typeface="Leelawadee UI"/>
+        <a:font script="Bopo" typeface="Microsoft JhengHei"/>
+        <a:font script="Java" typeface="Javanese Text"/>
+        <a:font script="Lisu" typeface="Segoe UI"/>
+        <a:font script="Mymr" typeface="Myanmar Text"/>
+        <a:font script="Nkoo" typeface="Ebrima"/>
+        <a:font script="Olck" typeface="Nirmala UI"/>
+        <a:font script="Osma" typeface="Ebrima"/>
+        <a:font script="Phag" typeface="Phagspa"/>
+        <a:font script="Syrn" typeface="Estrangelo Edessa"/>
+        <a:font script="Syrj" typeface="Estrangelo Edessa"/>
+        <a:font script="Syre" typeface="Estrangelo Edessa"/>
+        <a:font script="Sora" typeface="Nirmala UI"/>
+        <a:font script="Tale" typeface="Microsoft Tai Le"/>
+        <a:font script="Talu" typeface="Microsoft New Tai Lue"/>
+        <a:font script="Tfng" typeface="Ebrima"/>
+      </a:majorFont>
+      <a:minorFont>
+        <a:latin typeface="Calibri" panose="020F0502020204030204"/>
+        <a:ea typeface=""/>
+        <a:cs typeface=""/>
+        <a:font script="Jpan" typeface="游ゴシック"/>
+        <a:font script="Hang" typeface="맑은 고딕"/>
+        <a:font script="Hans" typeface="等线"/>
+        <a:font script="Hant" typeface="新細明體"/>
+        <a:font script="Arab" typeface="Arial"/>
+        <a:font script="Hebr" typeface="Arial"/>
+        <a:font script="Thai" typeface="Cordia New"/>
+        <a:font script="Ethi" typeface="Nyala"/>
+        <a:font script="Beng" typeface="Vrinda"/>
+        <a:font script="Gujr" typeface="Shruti"/>
+        <a:font script="Khmr" typeface="DaunPenh"/>
+        <a:font script="Knda" typeface="Tunga"/>
+        <a:font script="Guru" typeface="Raavi"/>
+        <a:font script="Cans" typeface="Euphemia"/>
+        <a:font script="Cher" typeface="Plantagenet Cherokee"/>
+        <a:font script="Yiii" typeface="Microsoft Yi Baiti"/>
+        <a:font script="Tibt" typeface="Microsoft Himalaya"/>
+        <a:font script="Thaa" typeface="MV Boli"/>
+        <a:font script="Deva" typeface="Mangal"/>
+        <a:font script="Telu" typeface="Gautami"/>
+        <a:font script="Taml" typeface="Latha"/>
+        <a:font script="Syrc" typeface="Estrangelo Edessa"/>
+        <a:font script="Orya" typeface="Kalinga"/>
+        <a:font script="Mlym" typeface="Kartika"/>
+        <a:font script="Laoo" typeface="DokChampa"/>
+        <a:font script="Sinh" typeface="Iskoola Pota"/>
+        <a:font script="Mong" typeface="Mongolian Baiti"/>
+        <a:font script="Viet" typeface="Arial"/>
+        <a:font script="Uigh" typeface="Microsoft Uighur"/>
+        <a:font script="Geor" typeface="Sylfaen"/>
+        <a:font script="Armn" typeface="Arial"/>
+        <a:font script="Bugi" typeface="Leelawadee UI"/>
+        <a:font script="Bopo" typeface="Microsoft JhengHei"/>
+        <a:font script="Java" typeface="Javanese Text"/>
+        <a:font script="Lisu" typeface="Segoe UI"/>
+        <a:font script="Mymr" typeface="Myanmar Text"/>
+        <a:font script="Nkoo" typeface="Ebrima"/>
+        <a:font script="Olck" typeface="Nirmala UI"/>
+        <a:font script="Osma" typeface="Ebrima"/>
+        <a:font script="Phag" typeface="Phagspa"/>
+        <a:font script="Syrn" typeface="Estrangelo Edessa"/>
+        <a:font script="Syrj" typeface="Estrangelo Edessa"/>
+        <a:font script="Syre" typeface="Estrangelo Edessa"/>
+        <a:font script="Sora" typeface="Nirmala UI"/>
+        <a:font script="Tale" typeface="Microsoft Tai Le"/>
+        <a:font script="Talu" typeface="Microsoft New Tai Lue"/>
+        <a:font script="Tfng" typeface="Ebrima"/>
+      </a:minorFont>
+    </a:fontScheme>
+    <a:fmtScheme name="Office">
+      <a:fillStyleLst>
+        <a:solidFill>
+          <a:schemeClr val="phClr"/>
+        </a:solidFill>
+        <a:gradFill rotWithShape="1">
+          <a:gsLst>
+            <a:gs pos="0">
+              <a:schemeClr val="phClr">
+                <a:lumMod val="110000"/>
+                <a:satMod val="105000"/>
+                <a:tint val="67000"/>
+              </a:schemeClr>
+            </a:gs>
+            <a:gs pos="50000">
+              <a:schemeClr val="phClr">
+                <a:lumMod val="105000"/>
+                <a:satMod val="103000"/>
+                <a:tint val="73000"/>
+              </a:schemeClr>
+            </a:gs>
+            <a:gs pos="100000">
+              <a:schemeClr val="phClr">
+                <a:lumMod val="105000"/>
+                <a:satMod val="109000"/>
+                <a:tint val="81000"/>
+              </a:schemeClr>
+            </a:gs>
+          </a:gsLst>
+          <a:lin ang="5400000" scaled="0"/>
+        </a:gradFill>
+        <a:gradFill rotWithShape="1">
+          <a:gsLst>
+            <a:gs pos="0">
+              <a:schemeClr val="phClr">
+                <a:satMod val="103000"/>
+                <a:lumMod val="102000"/>
+                <a:tint val="94000"/>
+              </a:schemeClr>
+            </a:gs>
+            <a:gs pos="50000">
+              <a:schemeClr val="phClr">
+                <a:satMod val="110000"/>
+                <a:lumMod val="100000"/>
+                <a:shade val="100000"/>
+              </a:schemeClr>
+            </a:gs>
+            <a:gs pos="100000">
+              <a:schemeClr val="phClr">
+                <a:lumMod val="99000"/>
+                <a:satMod val="120000"/>
+                <a:shade val="78000"/>
+              </a:schemeClr>
+            </a:gs>
+          </a:gsLst>
+          <a:lin ang="5400000" scaled="0"/>
+        </a:gradFill>
+      </a:fillStyleLst>
+      <a:lnStyleLst>
+        <a:ln w="6350" cap="flat" cmpd="sng" algn="ctr">
+          <a:solidFill>
+            <a:schemeClr val="phClr"/>
+          </a:solidFill>
+          <a:prstDash val="solid"/>
+          <a:miter lim="800000"/>
+        </a:ln>
+        <a:ln w="12700" cap="flat" cmpd="sng" algn="ctr">
+          <a:solidFill>
+            <a:schemeClr val="phClr"/>
+          </a:solidFill>
+          <a:prstDash val="solid"/>
+          <a:miter lim="800000"/>
+        </a:ln>
+        <a:ln w="19050" cap="flat" cmpd="sng" algn="ctr">
+          <a:solidFill>
+            <a:schemeClr val="phClr"/>
+          </a:solidFill>
+          <a:prstDash val="solid"/>
+          <a:miter lim="800000"/>
+        </a:ln>
+      </a:lnStyleLst>
+      <a:effectStyleLst>
+        <a:effectStyle>
+          <a:effectLst/>
+        </a:effectStyle>
+        <a:effectStyle>
+          <a:effectLst/>
+        </a:effectStyle>
+        <a:effectStyle>
+          <a:effectLst>
+            <a:outerShdw blurRad="57150" dist="19050" dir="5400000" algn="ctr" rotWithShape="0">
+              <a:srgbClr val="000000">
+                <a:alpha val="63000"/>
+              </a:srgbClr>
+            </a:outerShdw>
+          </a:effectLst>
+        </a:effectStyle>
+      </a:effectStyleLst>
+      <a:bgFillStyleLst>
+        <a:solidFill>
+          <a:schemeClr val="phClr"/>
+        </a:solidFill>
+        <a:solidFill>
+          <a:schemeClr val="phClr">
+            <a:tint val="95000"/>
+            <a:satMod val="170000"/>
+          </a:schemeClr>
+        </a:solidFill>
+        <a:gradFill rotWithShape="1">
+          <a:gsLst>
+            <a:gs pos="0">
+              <a:schemeClr val="phClr">
+                <a:tint val="93000"/>
+                <a:satMod val="150000"/>
+                <a:shade val="98000"/>
+                <a:lumMod val="102000"/>
+              </a:schemeClr>
+            </a:gs>
+            <a:gs pos="50000">
+              <a:schemeClr val="phClr">
+                <a:tint val="98000"/>
+                <a:satMod val="130000"/>
+                <a:shade val="90000"/>
+                <a:lumMod val="103000"/>
+              </a:schemeClr>
+            </a:gs>
+            <a:gs pos="100000">
+              <a:schemeClr val="phClr">
+                <a:shade val="63000"/>
+                <a:satMod val="120000"/>
+              </a:schemeClr>
+            </a:gs>
+          </a:gsLst>
+          <a:lin ang="5400000" scaled="0"/>
+        </a:gradFill>
+      </a:bgFillStyleLst>
+    </a:fmtScheme>
+  </a:themeElements>
+  <a:objectDefaults/>
+  <a:extraClrSchemeLst/>
+  <a:extLst>
+    <a:ext uri="{05A4C25C-085E-4340-85A3-A5531E510DB2}">
+      <thm15:themeFamily xmlns:thm15="http://schemas.microsoft.com/office/thememl/2012/main" name="Office Theme" id="{62F939B6-93AF-4DB8-9C6B-D6C7DFDC589F}" vid="{4A3C46E8-61CC-4603-A589-7422A47A8E4A}"/>
+    </a:ext>
+  </a:extLst>
+</a:theme>
 </file>
</xml_diff>